<commit_message>
Add Architecture info v1
</commit_message>
<xml_diff>
--- a/docs/CoolBet.pptx
+++ b/docs/CoolBet.pptx
@@ -9,13 +9,16 @@
     <p:sldId id="257" r:id="rId3"/>
     <p:sldId id="258" r:id="rId4"/>
     <p:sldId id="259" r:id="rId5"/>
-    <p:sldId id="260" r:id="rId6"/>
-    <p:sldId id="261" r:id="rId7"/>
-    <p:sldId id="267" r:id="rId8"/>
-    <p:sldId id="262" r:id="rId9"/>
-    <p:sldId id="263" r:id="rId10"/>
-    <p:sldId id="264" r:id="rId11"/>
-    <p:sldId id="266" r:id="rId12"/>
+    <p:sldId id="268" r:id="rId6"/>
+    <p:sldId id="269" r:id="rId7"/>
+    <p:sldId id="270" r:id="rId8"/>
+    <p:sldId id="260" r:id="rId9"/>
+    <p:sldId id="261" r:id="rId10"/>
+    <p:sldId id="267" r:id="rId11"/>
+    <p:sldId id="262" r:id="rId12"/>
+    <p:sldId id="263" r:id="rId13"/>
+    <p:sldId id="264" r:id="rId14"/>
+    <p:sldId id="266" r:id="rId15"/>
   </p:sldIdLst>
   <p:sldSz cx="12192000" cy="6858000"/>
   <p:notesSz cx="6858000" cy="9144000"/>
@@ -114,6 +117,11 @@
       </a:defRPr>
     </a:lvl9pPr>
   </p:defaultTextStyle>
+  <p:extLst>
+    <p:ext uri="{EFAFB233-063F-42B5-8137-9DF3F51BA10A}">
+      <p15:sldGuideLst xmlns:p15="http://schemas.microsoft.com/office/powerpoint/2012/main"/>
+    </p:ext>
+  </p:extLst>
 </p:presentation>
 </file>
 
@@ -6570,7 +6578,7 @@
             <a:fld id="{11A6662E-FAF4-44BC-88B5-85A7CBFB6D30}" type="datetime1">
               <a:rPr lang="en-US" smtClean="0"/>
               <a:pPr/>
-              <a:t>8/4/2024</a:t>
+              <a:t>8/8/2024</a:t>
             </a:fld>
             <a:endParaRPr lang="en-US"/>
           </a:p>
@@ -6781,7 +6789,7 @@
           <a:p>
             <a:fld id="{4C559632-1575-4E14-B53B-3DC3D5ED3947}" type="datetime1">
               <a:rPr lang="en-US" smtClean="0"/>
-              <a:t>8/4/2024</a:t>
+              <a:t>8/8/2024</a:t>
             </a:fld>
             <a:endParaRPr lang="en-US"/>
           </a:p>
@@ -6989,7 +6997,7 @@
           <a:p>
             <a:fld id="{CC4A6868-2568-4CC9-B302-F37117B01A6E}" type="datetime1">
               <a:rPr lang="en-US" smtClean="0"/>
-              <a:t>8/4/2024</a:t>
+              <a:t>8/8/2024</a:t>
             </a:fld>
             <a:endParaRPr lang="en-US"/>
           </a:p>
@@ -7192,7 +7200,7 @@
           <a:p>
             <a:fld id="{0055F08A-1E71-4B2B-BB49-E743F2903911}" type="datetime1">
               <a:rPr lang="en-US" smtClean="0"/>
-              <a:t>8/4/2024</a:t>
+              <a:t>8/8/2024</a:t>
             </a:fld>
             <a:endParaRPr lang="en-US" dirty="0"/>
           </a:p>
@@ -7466,7 +7474,7 @@
           <a:p>
             <a:fld id="{15417D9E-721A-44BB-8863-9873FE64DA75}" type="datetime1">
               <a:rPr lang="en-US" smtClean="0"/>
-              <a:t>8/4/2024</a:t>
+              <a:t>8/8/2024</a:t>
             </a:fld>
             <a:endParaRPr lang="en-US"/>
           </a:p>
@@ -7736,7 +7744,7 @@
           <a:p>
             <a:fld id="{5F31DA2F-80B8-49CF-99FB-5ABCA53A607A}" type="datetime1">
               <a:rPr lang="en-US" smtClean="0"/>
-              <a:t>8/4/2024</a:t>
+              <a:t>8/8/2024</a:t>
             </a:fld>
             <a:endParaRPr lang="en-US"/>
           </a:p>
@@ -8149,7 +8157,7 @@
           <a:p>
             <a:fld id="{28852172-E6C9-4B6C-929A-A9DE3837BBF1}" type="datetime1">
               <a:rPr lang="en-US" smtClean="0"/>
-              <a:t>8/4/2024</a:t>
+              <a:t>8/8/2024</a:t>
             </a:fld>
             <a:endParaRPr lang="en-US"/>
           </a:p>
@@ -8295,7 +8303,7 @@
           <a:p>
             <a:fld id="{3AB41CFF-90C9-47B3-9DA1-F2BF8D839F7E}" type="datetime1">
               <a:rPr lang="en-US" smtClean="0"/>
-              <a:t>8/4/2024</a:t>
+              <a:t>8/8/2024</a:t>
             </a:fld>
             <a:endParaRPr lang="en-US"/>
           </a:p>
@@ -8408,7 +8416,7 @@
           <a:p>
             <a:fld id="{F06048FA-06AB-4884-A69B-986B96E68A24}" type="datetime1">
               <a:rPr lang="en-US" smtClean="0"/>
-              <a:t>8/4/2024</a:t>
+              <a:t>8/8/2024</a:t>
             </a:fld>
             <a:endParaRPr lang="en-US"/>
           </a:p>
@@ -8719,7 +8727,7 @@
           <a:p>
             <a:fld id="{50DB7ABA-0172-4F9C-889D-567164F66BCD}" type="datetime1">
               <a:rPr lang="en-US" smtClean="0"/>
-              <a:t>8/4/2024</a:t>
+              <a:t>8/8/2024</a:t>
             </a:fld>
             <a:endParaRPr lang="en-US"/>
           </a:p>
@@ -9010,7 +9018,7 @@
           <a:p>
             <a:fld id="{78AC6A5B-8AE7-4A41-B5A7-9ADC6686DC18}" type="datetime1">
               <a:rPr lang="en-US" smtClean="0"/>
-              <a:t>8/4/2024</a:t>
+              <a:t>8/8/2024</a:t>
             </a:fld>
             <a:endParaRPr lang="en-US"/>
           </a:p>
@@ -9356,7 +9364,7 @@
             <a:fld id="{57E0CF6C-748E-4B7A-BC8B-3011EF78ED13}" type="datetime1">
               <a:rPr lang="en-US" smtClean="0"/>
               <a:pPr/>
-              <a:t>8/4/2024</a:t>
+              <a:t>8/8/2024</a:t>
             </a:fld>
             <a:endParaRPr lang="en-US" dirty="0"/>
           </a:p>
@@ -10428,6 +10436,1471 @@
       </p:grpSpPr>
       <p:sp useBgFill="1">
         <p:nvSpPr>
+          <p:cNvPr id="28" name="Rectangle 27">
+            <a:extLst>
+              <a:ext uri="{FF2B5EF4-FFF2-40B4-BE49-F238E27FC236}">
+                <a16:creationId xmlns:a16="http://schemas.microsoft.com/office/drawing/2014/main" id="{8651CFA9-6065-4243-AC48-858E359780B1}"/>
+              </a:ext>
+              <a:ext uri="{C183D7F6-B498-43B3-948B-1728B52AA6E4}">
+                <adec:decorative xmlns:adec="http://schemas.microsoft.com/office/drawing/2017/decorative" val="1"/>
+              </a:ext>
+            </a:extLst>
+          </p:cNvPr>
+          <p:cNvSpPr>
+            <a:spLocks noGrp="1" noRot="1" noChangeAspect="1" noMove="1" noResize="1" noEditPoints="1" noAdjustHandles="1" noChangeArrowheads="1" noChangeShapeType="1" noTextEdit="1"/>
+          </p:cNvSpPr>
+          <p:nvPr>
+            <p:extLst>
+              <p:ext uri="{386F3935-93C4-4BCD-93E2-E3B085C9AB24}">
+                <p16:designElem xmlns:p16="http://schemas.microsoft.com/office/powerpoint/2015/main" val="1"/>
+              </p:ext>
+            </p:extLst>
+          </p:nvPr>
+        </p:nvSpPr>
+        <p:spPr>
+          <a:xfrm>
+            <a:off x="0" y="0"/>
+            <a:ext cx="12188952" cy="6858000"/>
+          </a:xfrm>
+          <a:prstGeom prst="rect">
+            <a:avLst/>
+          </a:prstGeom>
+          <a:ln>
+            <a:noFill/>
+          </a:ln>
+        </p:spPr>
+        <p:style>
+          <a:lnRef idx="2">
+            <a:schemeClr val="accent1">
+              <a:shade val="50000"/>
+            </a:schemeClr>
+          </a:lnRef>
+          <a:fillRef idx="1">
+            <a:schemeClr val="accent1"/>
+          </a:fillRef>
+          <a:effectRef idx="0">
+            <a:schemeClr val="accent1"/>
+          </a:effectRef>
+          <a:fontRef idx="minor">
+            <a:schemeClr val="lt1"/>
+          </a:fontRef>
+        </p:style>
+        <p:txBody>
+          <a:bodyPr rtlCol="0" anchor="ctr"/>
+          <a:lstStyle/>
+          <a:p>
+            <a:pPr algn="ctr"/>
+            <a:endParaRPr lang="en-US" dirty="0">
+              <a:solidFill>
+                <a:schemeClr val="tx1">
+                  <a:lumMod val="65000"/>
+                  <a:lumOff val="35000"/>
+                </a:schemeClr>
+              </a:solidFill>
+              <a:latin typeface="AvenirNext LT Pro Medium" panose="020B0504020202020204" pitchFamily="34" charset="0"/>
+            </a:endParaRPr>
+          </a:p>
+        </p:txBody>
+      </p:sp>
+      <p:sp>
+        <p:nvSpPr>
+          <p:cNvPr id="30" name="Rectangle 29">
+            <a:extLst>
+              <a:ext uri="{FF2B5EF4-FFF2-40B4-BE49-F238E27FC236}">
+                <a16:creationId xmlns:a16="http://schemas.microsoft.com/office/drawing/2014/main" id="{5A8C81AE-8F0D-49F3-9FB4-334B0DCDF195}"/>
+              </a:ext>
+              <a:ext uri="{C183D7F6-B498-43B3-948B-1728B52AA6E4}">
+                <adec:decorative xmlns:adec="http://schemas.microsoft.com/office/drawing/2017/decorative" val="1"/>
+              </a:ext>
+            </a:extLst>
+          </p:cNvPr>
+          <p:cNvSpPr>
+            <a:spLocks noGrp="1" noRot="1" noChangeAspect="1" noMove="1" noResize="1" noEditPoints="1" noAdjustHandles="1" noChangeArrowheads="1" noChangeShapeType="1" noTextEdit="1"/>
+          </p:cNvSpPr>
+          <p:nvPr>
+            <p:extLst>
+              <p:ext uri="{386F3935-93C4-4BCD-93E2-E3B085C9AB24}">
+                <p16:designElem xmlns:p16="http://schemas.microsoft.com/office/powerpoint/2015/main" val="1"/>
+              </p:ext>
+            </p:extLst>
+          </p:nvPr>
+        </p:nvSpPr>
+        <p:spPr>
+          <a:xfrm>
+            <a:off x="3048" y="0"/>
+            <a:ext cx="12188952" cy="6858000"/>
+          </a:xfrm>
+          <a:prstGeom prst="rect">
+            <a:avLst/>
+          </a:prstGeom>
+          <a:solidFill>
+            <a:schemeClr val="bg2">
+              <a:alpha val="70000"/>
+            </a:schemeClr>
+          </a:solidFill>
+          <a:ln>
+            <a:noFill/>
+          </a:ln>
+        </p:spPr>
+        <p:style>
+          <a:lnRef idx="2">
+            <a:schemeClr val="accent1">
+              <a:shade val="50000"/>
+            </a:schemeClr>
+          </a:lnRef>
+          <a:fillRef idx="1">
+            <a:schemeClr val="accent1"/>
+          </a:fillRef>
+          <a:effectRef idx="0">
+            <a:schemeClr val="accent1"/>
+          </a:effectRef>
+          <a:fontRef idx="minor">
+            <a:schemeClr val="lt1"/>
+          </a:fontRef>
+        </p:style>
+        <p:txBody>
+          <a:bodyPr rtlCol="0" anchor="ctr"/>
+          <a:lstStyle/>
+          <a:p>
+            <a:pPr algn="ctr"/>
+            <a:endParaRPr lang="en-US">
+              <a:solidFill>
+                <a:schemeClr val="tx1">
+                  <a:lumMod val="65000"/>
+                  <a:lumOff val="35000"/>
+                </a:schemeClr>
+              </a:solidFill>
+              <a:latin typeface="AvenirNext LT Pro Medium" panose="020B0504020202020204" pitchFamily="34" charset="0"/>
+            </a:endParaRPr>
+          </a:p>
+        </p:txBody>
+      </p:sp>
+      <p:pic>
+        <p:nvPicPr>
+          <p:cNvPr id="32" name="Picture 31">
+            <a:extLst>
+              <a:ext uri="{FF2B5EF4-FFF2-40B4-BE49-F238E27FC236}">
+                <a16:creationId xmlns:a16="http://schemas.microsoft.com/office/drawing/2014/main" id="{29DA4B2B-B54E-43B4-A1A4-EB704F7F3D41}"/>
+              </a:ext>
+              <a:ext uri="{C183D7F6-B498-43B3-948B-1728B52AA6E4}">
+                <adec:decorative xmlns:adec="http://schemas.microsoft.com/office/drawing/2017/decorative" val="1"/>
+              </a:ext>
+            </a:extLst>
+          </p:cNvPr>
+          <p:cNvPicPr>
+            <a:picLocks noGrp="1" noRot="1" noChangeAspect="1" noMove="1" noResize="1" noEditPoints="1" noAdjustHandles="1" noChangeArrowheads="1" noChangeShapeType="1" noCrop="1"/>
+          </p:cNvPicPr>
+          <p:nvPr>
+            <p:extLst>
+              <p:ext uri="{386F3935-93C4-4BCD-93E2-E3B085C9AB24}">
+                <p16:designElem xmlns:p16="http://schemas.microsoft.com/office/powerpoint/2015/main" val="1"/>
+              </p:ext>
+            </p:extLst>
+          </p:nvPr>
+        </p:nvPicPr>
+        <p:blipFill rotWithShape="1">
+          <a:blip r:embed="rId2">
+            <a:duotone>
+              <a:schemeClr val="accent1">
+                <a:shade val="45000"/>
+                <a:satMod val="135000"/>
+              </a:schemeClr>
+              <a:prstClr val="white"/>
+            </a:duotone>
+            <a:extLst>
+              <a:ext uri="{28A0092B-C50C-407E-A947-70E740481C1C}">
+                <a14:useLocalDpi xmlns:a14="http://schemas.microsoft.com/office/drawing/2010/main" val="0"/>
+              </a:ext>
+            </a:extLst>
+          </a:blip>
+          <a:srcRect l="53001" t="54841" r="-1"/>
+          <a:stretch/>
+        </p:blipFill>
+        <p:spPr>
+          <a:xfrm>
+            <a:off x="0" y="0"/>
+            <a:ext cx="872377" cy="838200"/>
+          </a:xfrm>
+          <a:prstGeom prst="rect">
+            <a:avLst/>
+          </a:prstGeom>
+        </p:spPr>
+      </p:pic>
+      <p:sp>
+        <p:nvSpPr>
+          <p:cNvPr id="2" name="Заголовок 1">
+            <a:extLst>
+              <a:ext uri="{FF2B5EF4-FFF2-40B4-BE49-F238E27FC236}">
+                <a16:creationId xmlns:a16="http://schemas.microsoft.com/office/drawing/2014/main" id="{3374C866-6804-4DB6-71B2-8547BF24B0D5}"/>
+              </a:ext>
+            </a:extLst>
+          </p:cNvPr>
+          <p:cNvSpPr>
+            <a:spLocks noGrp="1"/>
+          </p:cNvSpPr>
+          <p:nvPr>
+            <p:ph type="title"/>
+          </p:nvPr>
+        </p:nvSpPr>
+        <p:spPr>
+          <a:xfrm>
+            <a:off x="838200" y="559813"/>
+            <a:ext cx="5638800" cy="1573786"/>
+          </a:xfrm>
+        </p:spPr>
+        <p:txBody>
+          <a:bodyPr vert="horz" lIns="91440" tIns="45720" rIns="91440" bIns="45720" rtlCol="0">
+            <a:normAutofit/>
+          </a:bodyPr>
+          <a:lstStyle/>
+          <a:p>
+            <a:r>
+              <a:rPr lang="en-US">
+                <a:solidFill>
+                  <a:schemeClr val="tx2"/>
+                </a:solidFill>
+              </a:rPr>
+              <a:t>Администраторская панель</a:t>
+            </a:r>
+          </a:p>
+        </p:txBody>
+      </p:sp>
+      <p:sp>
+        <p:nvSpPr>
+          <p:cNvPr id="7" name="Объект 6">
+            <a:extLst>
+              <a:ext uri="{FF2B5EF4-FFF2-40B4-BE49-F238E27FC236}">
+                <a16:creationId xmlns:a16="http://schemas.microsoft.com/office/drawing/2014/main" id="{6A24702A-D99B-B4D9-0E60-4B051C89C1DA}"/>
+              </a:ext>
+            </a:extLst>
+          </p:cNvPr>
+          <p:cNvSpPr>
+            <a:spLocks noGrp="1"/>
+          </p:cNvSpPr>
+          <p:nvPr>
+            <p:ph idx="1"/>
+          </p:nvPr>
+        </p:nvSpPr>
+        <p:spPr>
+          <a:xfrm>
+            <a:off x="6687160" y="559814"/>
+            <a:ext cx="4633486" cy="1573786"/>
+          </a:xfrm>
+        </p:spPr>
+        <p:txBody>
+          <a:bodyPr vert="horz" lIns="91440" tIns="45720" rIns="91440" bIns="45720" rtlCol="0">
+            <a:normAutofit/>
+          </a:bodyPr>
+          <a:lstStyle/>
+          <a:p>
+            <a:pPr marL="0" indent="0">
+              <a:buNone/>
+            </a:pPr>
+            <a:r>
+              <a:rPr lang="ru-RU" sz="1800" dirty="0">
+                <a:solidFill>
+                  <a:schemeClr val="tx2"/>
+                </a:solidFill>
+              </a:rPr>
+              <a:t>Создание</a:t>
+            </a:r>
+            <a:r>
+              <a:rPr lang="en-US" sz="1800" dirty="0">
+                <a:solidFill>
+                  <a:schemeClr val="tx2"/>
+                </a:solidFill>
+              </a:rPr>
+              <a:t> </a:t>
+            </a:r>
+            <a:r>
+              <a:rPr lang="ru-RU" sz="1800" dirty="0">
+                <a:solidFill>
+                  <a:schemeClr val="tx2"/>
+                </a:solidFill>
+              </a:rPr>
+              <a:t>администраторской панели для управления событиями и пользователями</a:t>
+            </a:r>
+            <a:endParaRPr lang="en-US" sz="1800" dirty="0">
+              <a:solidFill>
+                <a:schemeClr val="tx2"/>
+              </a:solidFill>
+            </a:endParaRPr>
+          </a:p>
+        </p:txBody>
+      </p:sp>
+      <p:pic>
+        <p:nvPicPr>
+          <p:cNvPr id="8" name="Объект 4">
+            <a:extLst>
+              <a:ext uri="{FF2B5EF4-FFF2-40B4-BE49-F238E27FC236}">
+                <a16:creationId xmlns:a16="http://schemas.microsoft.com/office/drawing/2014/main" id="{E7071738-7A18-AD75-98B9-1185AB4B87C0}"/>
+              </a:ext>
+            </a:extLst>
+          </p:cNvPr>
+          <p:cNvPicPr>
+            <a:picLocks noChangeAspect="1"/>
+          </p:cNvPicPr>
+          <p:nvPr/>
+        </p:nvPicPr>
+        <p:blipFill>
+          <a:blip r:embed="rId3"/>
+          <a:stretch>
+            <a:fillRect/>
+          </a:stretch>
+        </p:blipFill>
+        <p:spPr>
+          <a:xfrm>
+            <a:off x="2362958" y="2385716"/>
+            <a:ext cx="7466084" cy="3919694"/>
+          </a:xfrm>
+          <a:prstGeom prst="rect">
+            <a:avLst/>
+          </a:prstGeom>
+        </p:spPr>
+      </p:pic>
+      <p:pic>
+        <p:nvPicPr>
+          <p:cNvPr id="34" name="Picture 33">
+            <a:extLst>
+              <a:ext uri="{FF2B5EF4-FFF2-40B4-BE49-F238E27FC236}">
+                <a16:creationId xmlns:a16="http://schemas.microsoft.com/office/drawing/2014/main" id="{1C32610F-5445-4E12-87F6-F0591ABE7AD1}"/>
+              </a:ext>
+              <a:ext uri="{C183D7F6-B498-43B3-948B-1728B52AA6E4}">
+                <adec:decorative xmlns:adec="http://schemas.microsoft.com/office/drawing/2017/decorative" val="1"/>
+              </a:ext>
+            </a:extLst>
+          </p:cNvPr>
+          <p:cNvPicPr>
+            <a:picLocks noGrp="1" noRot="1" noChangeAspect="1" noMove="1" noResize="1" noEditPoints="1" noAdjustHandles="1" noChangeArrowheads="1" noChangeShapeType="1" noCrop="1"/>
+          </p:cNvPicPr>
+          <p:nvPr>
+            <p:extLst>
+              <p:ext uri="{386F3935-93C4-4BCD-93E2-E3B085C9AB24}">
+                <p16:designElem xmlns:p16="http://schemas.microsoft.com/office/powerpoint/2015/main" val="1"/>
+              </p:ext>
+            </p:extLst>
+          </p:nvPr>
+        </p:nvPicPr>
+        <p:blipFill rotWithShape="1">
+          <a:blip r:embed="rId4">
+            <a:duotone>
+              <a:schemeClr val="accent1">
+                <a:shade val="45000"/>
+                <a:satMod val="135000"/>
+              </a:schemeClr>
+              <a:prstClr val="white"/>
+            </a:duotone>
+            <a:extLst>
+              <a:ext uri="{28A0092B-C50C-407E-A947-70E740481C1C}">
+                <a14:useLocalDpi xmlns:a14="http://schemas.microsoft.com/office/drawing/2010/main" val="0"/>
+              </a:ext>
+            </a:extLst>
+          </a:blip>
+          <a:srcRect r="73964"/>
+          <a:stretch/>
+        </p:blipFill>
+        <p:spPr>
+          <a:xfrm>
+            <a:off x="11527047" y="3144779"/>
+            <a:ext cx="661905" cy="2548349"/>
+          </a:xfrm>
+          <a:prstGeom prst="rect">
+            <a:avLst/>
+          </a:prstGeom>
+        </p:spPr>
+      </p:pic>
+    </p:spTree>
+    <p:extLst>
+      <p:ext uri="{BB962C8B-B14F-4D97-AF65-F5344CB8AC3E}">
+        <p14:creationId xmlns:p14="http://schemas.microsoft.com/office/powerpoint/2010/main" val="865229869"/>
+      </p:ext>
+    </p:extLst>
+  </p:cSld>
+  <p:clrMapOvr>
+    <a:masterClrMapping/>
+  </p:clrMapOvr>
+</p:sld>
+</file>
+
+<file path=ppt/slides/slide11.xml><?xml version="1.0" encoding="utf-8"?>
+<p:sld xmlns:a="http://schemas.openxmlformats.org/drawingml/2006/main" xmlns:r="http://schemas.openxmlformats.org/officeDocument/2006/relationships" xmlns:p="http://schemas.openxmlformats.org/presentationml/2006/main">
+  <p:cSld>
+    <p:bg>
+      <p:bgPr>
+        <a:solidFill>
+          <a:schemeClr val="bg1"/>
+        </a:solidFill>
+        <a:effectLst/>
+      </p:bgPr>
+    </p:bg>
+    <p:spTree>
+      <p:nvGrpSpPr>
+        <p:cNvPr id="1" name=""/>
+        <p:cNvGrpSpPr/>
+        <p:nvPr/>
+      </p:nvGrpSpPr>
+      <p:grpSpPr>
+        <a:xfrm>
+          <a:off x="0" y="0"/>
+          <a:ext cx="0" cy="0"/>
+          <a:chOff x="0" y="0"/>
+          <a:chExt cx="0" cy="0"/>
+        </a:xfrm>
+      </p:grpSpPr>
+      <p:sp useBgFill="1">
+        <p:nvSpPr>
+          <p:cNvPr id="41" name="Rectangle 40">
+            <a:extLst>
+              <a:ext uri="{FF2B5EF4-FFF2-40B4-BE49-F238E27FC236}">
+                <a16:creationId xmlns:a16="http://schemas.microsoft.com/office/drawing/2014/main" id="{8651CFA9-6065-4243-AC48-858E359780B1}"/>
+              </a:ext>
+              <a:ext uri="{C183D7F6-B498-43B3-948B-1728B52AA6E4}">
+                <adec:decorative xmlns:adec="http://schemas.microsoft.com/office/drawing/2017/decorative" val="1"/>
+              </a:ext>
+            </a:extLst>
+          </p:cNvPr>
+          <p:cNvSpPr>
+            <a:spLocks noGrp="1" noRot="1" noChangeAspect="1" noMove="1" noResize="1" noEditPoints="1" noAdjustHandles="1" noChangeArrowheads="1" noChangeShapeType="1" noTextEdit="1"/>
+          </p:cNvSpPr>
+          <p:nvPr>
+            <p:extLst>
+              <p:ext uri="{386F3935-93C4-4BCD-93E2-E3B085C9AB24}">
+                <p16:designElem xmlns:p16="http://schemas.microsoft.com/office/powerpoint/2015/main" val="1"/>
+              </p:ext>
+            </p:extLst>
+          </p:nvPr>
+        </p:nvSpPr>
+        <p:spPr>
+          <a:xfrm>
+            <a:off x="0" y="0"/>
+            <a:ext cx="12188952" cy="6858000"/>
+          </a:xfrm>
+          <a:prstGeom prst="rect">
+            <a:avLst/>
+          </a:prstGeom>
+          <a:ln>
+            <a:noFill/>
+          </a:ln>
+        </p:spPr>
+        <p:style>
+          <a:lnRef idx="2">
+            <a:schemeClr val="accent1">
+              <a:shade val="50000"/>
+            </a:schemeClr>
+          </a:lnRef>
+          <a:fillRef idx="1">
+            <a:schemeClr val="accent1"/>
+          </a:fillRef>
+          <a:effectRef idx="0">
+            <a:schemeClr val="accent1"/>
+          </a:effectRef>
+          <a:fontRef idx="minor">
+            <a:schemeClr val="lt1"/>
+          </a:fontRef>
+        </p:style>
+        <p:txBody>
+          <a:bodyPr rtlCol="0" anchor="ctr"/>
+          <a:lstStyle/>
+          <a:p>
+            <a:pPr algn="ctr"/>
+            <a:endParaRPr lang="en-US">
+              <a:solidFill>
+                <a:schemeClr val="tx1">
+                  <a:lumMod val="65000"/>
+                  <a:lumOff val="35000"/>
+                </a:schemeClr>
+              </a:solidFill>
+              <a:latin typeface="AvenirNext LT Pro Medium" panose="020B0504020202020204" pitchFamily="34" charset="0"/>
+            </a:endParaRPr>
+          </a:p>
+        </p:txBody>
+      </p:sp>
+      <p:sp>
+        <p:nvSpPr>
+          <p:cNvPr id="43" name="Rectangle 42">
+            <a:extLst>
+              <a:ext uri="{FF2B5EF4-FFF2-40B4-BE49-F238E27FC236}">
+                <a16:creationId xmlns:a16="http://schemas.microsoft.com/office/drawing/2014/main" id="{37962AE0-6A1C-4B76-9D52-10E5E6D7D3BB}"/>
+              </a:ext>
+              <a:ext uri="{C183D7F6-B498-43B3-948B-1728B52AA6E4}">
+                <adec:decorative xmlns:adec="http://schemas.microsoft.com/office/drawing/2017/decorative" val="1"/>
+              </a:ext>
+            </a:extLst>
+          </p:cNvPr>
+          <p:cNvSpPr>
+            <a:spLocks noGrp="1" noRot="1" noChangeAspect="1" noMove="1" noResize="1" noEditPoints="1" noAdjustHandles="1" noChangeArrowheads="1" noChangeShapeType="1" noTextEdit="1"/>
+          </p:cNvSpPr>
+          <p:nvPr>
+            <p:extLst>
+              <p:ext uri="{386F3935-93C4-4BCD-93E2-E3B085C9AB24}">
+                <p16:designElem xmlns:p16="http://schemas.microsoft.com/office/powerpoint/2015/main" val="1"/>
+              </p:ext>
+            </p:extLst>
+          </p:nvPr>
+        </p:nvSpPr>
+        <p:spPr>
+          <a:xfrm>
+            <a:off x="0" y="0"/>
+            <a:ext cx="12188952" cy="6858000"/>
+          </a:xfrm>
+          <a:prstGeom prst="rect">
+            <a:avLst/>
+          </a:prstGeom>
+          <a:solidFill>
+            <a:schemeClr val="bg2">
+              <a:alpha val="70000"/>
+            </a:schemeClr>
+          </a:solidFill>
+          <a:ln>
+            <a:noFill/>
+          </a:ln>
+        </p:spPr>
+        <p:style>
+          <a:lnRef idx="2">
+            <a:schemeClr val="accent1">
+              <a:shade val="50000"/>
+            </a:schemeClr>
+          </a:lnRef>
+          <a:fillRef idx="1">
+            <a:schemeClr val="accent1"/>
+          </a:fillRef>
+          <a:effectRef idx="0">
+            <a:schemeClr val="accent1"/>
+          </a:effectRef>
+          <a:fontRef idx="minor">
+            <a:schemeClr val="lt1"/>
+          </a:fontRef>
+        </p:style>
+        <p:txBody>
+          <a:bodyPr rtlCol="0" anchor="ctr"/>
+          <a:lstStyle/>
+          <a:p>
+            <a:pPr algn="ctr"/>
+            <a:endParaRPr lang="en-US">
+              <a:solidFill>
+                <a:schemeClr val="tx1">
+                  <a:lumMod val="65000"/>
+                  <a:lumOff val="35000"/>
+                </a:schemeClr>
+              </a:solidFill>
+              <a:latin typeface="AvenirNext LT Pro Medium" panose="020B0504020202020204" pitchFamily="34" charset="0"/>
+            </a:endParaRPr>
+          </a:p>
+        </p:txBody>
+      </p:sp>
+      <p:sp>
+        <p:nvSpPr>
+          <p:cNvPr id="45" name="Rectangle 44">
+            <a:extLst>
+              <a:ext uri="{FF2B5EF4-FFF2-40B4-BE49-F238E27FC236}">
+                <a16:creationId xmlns:a16="http://schemas.microsoft.com/office/drawing/2014/main" id="{027CAEDE-D92D-4745-8749-71019415A797}"/>
+              </a:ext>
+              <a:ext uri="{C183D7F6-B498-43B3-948B-1728B52AA6E4}">
+                <adec:decorative xmlns:adec="http://schemas.microsoft.com/office/drawing/2017/decorative" val="1"/>
+              </a:ext>
+            </a:extLst>
+          </p:cNvPr>
+          <p:cNvSpPr>
+            <a:spLocks noGrp="1" noRot="1" noChangeAspect="1" noMove="1" noResize="1" noEditPoints="1" noAdjustHandles="1" noChangeArrowheads="1" noChangeShapeType="1" noTextEdit="1"/>
+          </p:cNvSpPr>
+          <p:nvPr>
+            <p:extLst>
+              <p:ext uri="{386F3935-93C4-4BCD-93E2-E3B085C9AB24}">
+                <p16:designElem xmlns:p16="http://schemas.microsoft.com/office/powerpoint/2015/main" val="1"/>
+              </p:ext>
+            </p:extLst>
+          </p:nvPr>
+        </p:nvSpPr>
+        <p:spPr>
+          <a:xfrm>
+            <a:off x="0" y="0"/>
+            <a:ext cx="6096000" cy="6858000"/>
+          </a:xfrm>
+          <a:prstGeom prst="rect">
+            <a:avLst/>
+          </a:prstGeom>
+          <a:solidFill>
+            <a:schemeClr val="tx2">
+              <a:lumMod val="90000"/>
+              <a:lumOff val="10000"/>
+            </a:schemeClr>
+          </a:solidFill>
+          <a:ln>
+            <a:noFill/>
+          </a:ln>
+        </p:spPr>
+        <p:style>
+          <a:lnRef idx="2">
+            <a:schemeClr val="accent1">
+              <a:shade val="50000"/>
+            </a:schemeClr>
+          </a:lnRef>
+          <a:fillRef idx="1">
+            <a:schemeClr val="accent1"/>
+          </a:fillRef>
+          <a:effectRef idx="0">
+            <a:schemeClr val="accent1"/>
+          </a:effectRef>
+          <a:fontRef idx="minor">
+            <a:schemeClr val="lt1"/>
+          </a:fontRef>
+        </p:style>
+        <p:txBody>
+          <a:bodyPr rtlCol="0" anchor="ctr"/>
+          <a:lstStyle/>
+          <a:p>
+            <a:pPr algn="ctr"/>
+            <a:endParaRPr lang="en-US" dirty="0"/>
+          </a:p>
+        </p:txBody>
+      </p:sp>
+      <p:sp>
+        <p:nvSpPr>
+          <p:cNvPr id="47" name="Rectangle 46">
+            <a:extLst>
+              <a:ext uri="{FF2B5EF4-FFF2-40B4-BE49-F238E27FC236}">
+                <a16:creationId xmlns:a16="http://schemas.microsoft.com/office/drawing/2014/main" id="{00C96CB6-3880-40E6-A4BF-F64E7D1E4295}"/>
+              </a:ext>
+              <a:ext uri="{C183D7F6-B498-43B3-948B-1728B52AA6E4}">
+                <adec:decorative xmlns:adec="http://schemas.microsoft.com/office/drawing/2017/decorative" val="1"/>
+              </a:ext>
+            </a:extLst>
+          </p:cNvPr>
+          <p:cNvSpPr>
+            <a:spLocks noGrp="1" noRot="1" noChangeAspect="1" noMove="1" noResize="1" noEditPoints="1" noAdjustHandles="1" noChangeArrowheads="1" noChangeShapeType="1" noTextEdit="1"/>
+          </p:cNvSpPr>
+          <p:nvPr>
+            <p:extLst>
+              <p:ext uri="{386F3935-93C4-4BCD-93E2-E3B085C9AB24}">
+                <p16:designElem xmlns:p16="http://schemas.microsoft.com/office/powerpoint/2015/main" val="1"/>
+              </p:ext>
+            </p:extLst>
+          </p:nvPr>
+        </p:nvSpPr>
+        <p:spPr>
+          <a:xfrm>
+            <a:off x="0" y="0"/>
+            <a:ext cx="6096000" cy="6858000"/>
+          </a:xfrm>
+          <a:prstGeom prst="rect">
+            <a:avLst/>
+          </a:prstGeom>
+          <a:blipFill dpi="0" rotWithShape="1">
+            <a:blip r:embed="rId2">
+              <a:alphaModFix amt="24000"/>
+              <a:duotone>
+                <a:schemeClr val="accent1">
+                  <a:shade val="45000"/>
+                  <a:satMod val="135000"/>
+                </a:schemeClr>
+                <a:prstClr val="white"/>
+              </a:duotone>
+            </a:blip>
+            <a:srcRect/>
+            <a:tile tx="889000" ty="0" sx="100000" sy="100000" flip="none" algn="tl"/>
+          </a:blipFill>
+          <a:ln>
+            <a:noFill/>
+          </a:ln>
+        </p:spPr>
+        <p:style>
+          <a:lnRef idx="2">
+            <a:schemeClr val="accent1">
+              <a:shade val="50000"/>
+            </a:schemeClr>
+          </a:lnRef>
+          <a:fillRef idx="1">
+            <a:schemeClr val="accent1"/>
+          </a:fillRef>
+          <a:effectRef idx="0">
+            <a:schemeClr val="accent1"/>
+          </a:effectRef>
+          <a:fontRef idx="minor">
+            <a:schemeClr val="lt1"/>
+          </a:fontRef>
+        </p:style>
+        <p:txBody>
+          <a:bodyPr rtlCol="0" anchor="ctr"/>
+          <a:lstStyle/>
+          <a:p>
+            <a:pPr algn="ctr"/>
+            <a:endParaRPr lang="en-US" dirty="0"/>
+          </a:p>
+        </p:txBody>
+      </p:sp>
+      <p:sp>
+        <p:nvSpPr>
+          <p:cNvPr id="2" name="Заголовок 1">
+            <a:extLst>
+              <a:ext uri="{FF2B5EF4-FFF2-40B4-BE49-F238E27FC236}">
+                <a16:creationId xmlns:a16="http://schemas.microsoft.com/office/drawing/2014/main" id="{254C042B-106C-0788-06CA-FBB56A76EAB3}"/>
+              </a:ext>
+            </a:extLst>
+          </p:cNvPr>
+          <p:cNvSpPr>
+            <a:spLocks noGrp="1"/>
+          </p:cNvSpPr>
+          <p:nvPr>
+            <p:ph type="title"/>
+          </p:nvPr>
+        </p:nvSpPr>
+        <p:spPr>
+          <a:xfrm>
+            <a:off x="838201" y="559813"/>
+            <a:ext cx="4876800" cy="5577934"/>
+          </a:xfrm>
+        </p:spPr>
+        <p:txBody>
+          <a:bodyPr>
+            <a:normAutofit/>
+          </a:bodyPr>
+          <a:lstStyle/>
+          <a:p>
+            <a:r>
+              <a:rPr lang="ru-RU" dirty="0"/>
+              <a:t>Функциональные требования</a:t>
+            </a:r>
+          </a:p>
+        </p:txBody>
+      </p:sp>
+      <p:sp>
+        <p:nvSpPr>
+          <p:cNvPr id="82" name="Объект 2">
+            <a:extLst>
+              <a:ext uri="{FF2B5EF4-FFF2-40B4-BE49-F238E27FC236}">
+                <a16:creationId xmlns:a16="http://schemas.microsoft.com/office/drawing/2014/main" id="{9DE9DC6C-7C7C-E371-0A51-2782A07F7B1A}"/>
+              </a:ext>
+            </a:extLst>
+          </p:cNvPr>
+          <p:cNvSpPr>
+            <a:spLocks noGrp="1"/>
+          </p:cNvSpPr>
+          <p:nvPr>
+            <p:ph idx="1"/>
+          </p:nvPr>
+        </p:nvSpPr>
+        <p:spPr>
+          <a:xfrm>
+            <a:off x="6705600" y="559813"/>
+            <a:ext cx="4467677" cy="5553275"/>
+          </a:xfrm>
+        </p:spPr>
+        <p:txBody>
+          <a:bodyPr>
+            <a:normAutofit/>
+          </a:bodyPr>
+          <a:lstStyle/>
+          <a:p>
+            <a:pPr>
+              <a:lnSpc>
+                <a:spcPct val="100000"/>
+              </a:lnSpc>
+            </a:pPr>
+            <a:r>
+              <a:rPr lang="ru-RU" sz="1500" dirty="0">
+                <a:solidFill>
+                  <a:schemeClr val="tx2"/>
+                </a:solidFill>
+              </a:rPr>
+              <a:t>Пользователи должны иметь возможность регистрироваться и входить в систему.</a:t>
+            </a:r>
+          </a:p>
+          <a:p>
+            <a:pPr>
+              <a:lnSpc>
+                <a:spcPct val="100000"/>
+              </a:lnSpc>
+            </a:pPr>
+            <a:r>
+              <a:rPr lang="ru-RU" sz="1500" dirty="0">
+                <a:solidFill>
+                  <a:schemeClr val="tx2"/>
+                </a:solidFill>
+              </a:rPr>
+              <a:t>Администраторы должны иметь возможность создавать, редактировать и удалять события.</a:t>
+            </a:r>
+          </a:p>
+          <a:p>
+            <a:pPr>
+              <a:lnSpc>
+                <a:spcPct val="100000"/>
+              </a:lnSpc>
+            </a:pPr>
+            <a:r>
+              <a:rPr lang="ru-RU" sz="1500" dirty="0">
+                <a:solidFill>
+                  <a:schemeClr val="tx2"/>
+                </a:solidFill>
+              </a:rPr>
+              <a:t>Пользователи должны иметь возможность делать ставки на доступные события.</a:t>
+            </a:r>
+          </a:p>
+          <a:p>
+            <a:pPr>
+              <a:lnSpc>
+                <a:spcPct val="100000"/>
+              </a:lnSpc>
+            </a:pPr>
+            <a:r>
+              <a:rPr lang="ru-RU" sz="1500" dirty="0">
+                <a:solidFill>
+                  <a:schemeClr val="tx2"/>
+                </a:solidFill>
+              </a:rPr>
+              <a:t>Пользователи должны иметь доступ к истории своих ставок и результатам.</a:t>
+            </a:r>
+          </a:p>
+          <a:p>
+            <a:pPr>
+              <a:lnSpc>
+                <a:spcPct val="100000"/>
+              </a:lnSpc>
+            </a:pPr>
+            <a:r>
+              <a:rPr lang="ru-RU" sz="1500" dirty="0">
+                <a:solidFill>
+                  <a:schemeClr val="tx2"/>
+                </a:solidFill>
+              </a:rPr>
+              <a:t>Внутренняя валюта (УЕ):</a:t>
+            </a:r>
+          </a:p>
+          <a:p>
+            <a:pPr lvl="1">
+              <a:lnSpc>
+                <a:spcPct val="100000"/>
+              </a:lnSpc>
+            </a:pPr>
+            <a:r>
+              <a:rPr lang="ru-RU" sz="1500" dirty="0">
+                <a:solidFill>
+                  <a:schemeClr val="tx2"/>
+                </a:solidFill>
+              </a:rPr>
+              <a:t>Система должна использовать внутреннюю валюту, условную единицу - "УЕ".</a:t>
+            </a:r>
+          </a:p>
+          <a:p>
+            <a:pPr lvl="1">
+              <a:lnSpc>
+                <a:spcPct val="100000"/>
+              </a:lnSpc>
+            </a:pPr>
+            <a:r>
+              <a:rPr lang="ru-RU" sz="1500" dirty="0">
+                <a:solidFill>
+                  <a:schemeClr val="tx2"/>
+                </a:solidFill>
+              </a:rPr>
+              <a:t>Должна быть возможность обновлять счета пользователей, когда они приобретают УЕ.</a:t>
+            </a:r>
+          </a:p>
+          <a:p>
+            <a:pPr lvl="1">
+              <a:lnSpc>
+                <a:spcPct val="100000"/>
+              </a:lnSpc>
+            </a:pPr>
+            <a:r>
+              <a:rPr lang="ru-RU" sz="1500" dirty="0">
+                <a:solidFill>
+                  <a:schemeClr val="tx2"/>
+                </a:solidFill>
+              </a:rPr>
+              <a:t>У пользователей должна быть возможность заказать конвертацию и вывод УЕ во вне.</a:t>
+            </a:r>
+          </a:p>
+        </p:txBody>
+      </p:sp>
+    </p:spTree>
+    <p:extLst>
+      <p:ext uri="{BB962C8B-B14F-4D97-AF65-F5344CB8AC3E}">
+        <p14:creationId xmlns:p14="http://schemas.microsoft.com/office/powerpoint/2010/main" val="434379438"/>
+      </p:ext>
+    </p:extLst>
+  </p:cSld>
+  <p:clrMapOvr>
+    <a:masterClrMapping/>
+  </p:clrMapOvr>
+</p:sld>
+</file>
+
+<file path=ppt/slides/slide12.xml><?xml version="1.0" encoding="utf-8"?>
+<p:sld xmlns:a="http://schemas.openxmlformats.org/drawingml/2006/main" xmlns:r="http://schemas.openxmlformats.org/officeDocument/2006/relationships" xmlns:p="http://schemas.openxmlformats.org/presentationml/2006/main">
+  <p:cSld>
+    <p:bg>
+      <p:bgPr>
+        <a:solidFill>
+          <a:schemeClr val="bg1"/>
+        </a:solidFill>
+        <a:effectLst/>
+      </p:bgPr>
+    </p:bg>
+    <p:spTree>
+      <p:nvGrpSpPr>
+        <p:cNvPr id="1" name=""/>
+        <p:cNvGrpSpPr/>
+        <p:nvPr/>
+      </p:nvGrpSpPr>
+      <p:grpSpPr>
+        <a:xfrm>
+          <a:off x="0" y="0"/>
+          <a:ext cx="0" cy="0"/>
+          <a:chOff x="0" y="0"/>
+          <a:chExt cx="0" cy="0"/>
+        </a:xfrm>
+      </p:grpSpPr>
+      <p:sp>
+        <p:nvSpPr>
+          <p:cNvPr id="13" name="Rectangle 12">
+            <a:extLst>
+              <a:ext uri="{FF2B5EF4-FFF2-40B4-BE49-F238E27FC236}">
+                <a16:creationId xmlns:a16="http://schemas.microsoft.com/office/drawing/2014/main" id="{0BABF38A-8A0D-492E-BD20-6CF4D46B50BD}"/>
+              </a:ext>
+              <a:ext uri="{C183D7F6-B498-43B3-948B-1728B52AA6E4}">
+                <adec:decorative xmlns:adec="http://schemas.microsoft.com/office/drawing/2017/decorative" val="1"/>
+              </a:ext>
+            </a:extLst>
+          </p:cNvPr>
+          <p:cNvSpPr>
+            <a:spLocks noGrp="1" noRot="1" noChangeAspect="1" noMove="1" noResize="1" noEditPoints="1" noAdjustHandles="1" noChangeArrowheads="1" noChangeShapeType="1" noTextEdit="1"/>
+          </p:cNvSpPr>
+          <p:nvPr>
+            <p:extLst>
+              <p:ext uri="{386F3935-93C4-4BCD-93E2-E3B085C9AB24}">
+                <p16:designElem xmlns:p16="http://schemas.microsoft.com/office/powerpoint/2015/main" val="1"/>
+              </p:ext>
+            </p:extLst>
+          </p:nvPr>
+        </p:nvSpPr>
+        <p:spPr>
+          <a:xfrm>
+            <a:off x="0" y="1"/>
+            <a:ext cx="12192000" cy="6858004"/>
+          </a:xfrm>
+          <a:prstGeom prst="rect">
+            <a:avLst/>
+          </a:prstGeom>
+          <a:solidFill>
+            <a:schemeClr val="tx2">
+              <a:lumMod val="90000"/>
+              <a:lumOff val="10000"/>
+            </a:schemeClr>
+          </a:solidFill>
+          <a:ln>
+            <a:noFill/>
+          </a:ln>
+        </p:spPr>
+        <p:style>
+          <a:lnRef idx="2">
+            <a:schemeClr val="accent1">
+              <a:shade val="50000"/>
+            </a:schemeClr>
+          </a:lnRef>
+          <a:fillRef idx="1">
+            <a:schemeClr val="accent1"/>
+          </a:fillRef>
+          <a:effectRef idx="0">
+            <a:schemeClr val="accent1"/>
+          </a:effectRef>
+          <a:fontRef idx="minor">
+            <a:schemeClr val="lt1"/>
+          </a:fontRef>
+        </p:style>
+        <p:txBody>
+          <a:bodyPr rtlCol="0" anchor="ctr"/>
+          <a:lstStyle/>
+          <a:p>
+            <a:pPr algn="ctr"/>
+            <a:endParaRPr lang="en-US" dirty="0">
+              <a:solidFill>
+                <a:schemeClr val="tx1">
+                  <a:lumMod val="65000"/>
+                  <a:lumOff val="35000"/>
+                </a:schemeClr>
+              </a:solidFill>
+              <a:latin typeface="AvenirNext LT Pro Medium" panose="020B0504020202020204" pitchFamily="34" charset="0"/>
+            </a:endParaRPr>
+          </a:p>
+        </p:txBody>
+      </p:sp>
+      <p:pic>
+        <p:nvPicPr>
+          <p:cNvPr id="15" name="Picture 14">
+            <a:extLst>
+              <a:ext uri="{FF2B5EF4-FFF2-40B4-BE49-F238E27FC236}">
+                <a16:creationId xmlns:a16="http://schemas.microsoft.com/office/drawing/2014/main" id="{1CB7E8AE-A3AC-4BB7-A5C6-F00EC697B265}"/>
+              </a:ext>
+              <a:ext uri="{C183D7F6-B498-43B3-948B-1728B52AA6E4}">
+                <adec:decorative xmlns:adec="http://schemas.microsoft.com/office/drawing/2017/decorative" val="1"/>
+              </a:ext>
+            </a:extLst>
+          </p:cNvPr>
+          <p:cNvPicPr>
+            <a:picLocks noGrp="1" noRot="1" noChangeAspect="1" noMove="1" noResize="1" noEditPoints="1" noAdjustHandles="1" noChangeArrowheads="1" noChangeShapeType="1" noCrop="1"/>
+          </p:cNvPicPr>
+          <p:nvPr>
+            <p:extLst>
+              <p:ext uri="{386F3935-93C4-4BCD-93E2-E3B085C9AB24}">
+                <p16:designElem xmlns:p16="http://schemas.microsoft.com/office/powerpoint/2015/main" val="1"/>
+              </p:ext>
+            </p:extLst>
+          </p:nvPr>
+        </p:nvPicPr>
+        <p:blipFill>
+          <a:blip r:embed="rId2">
+            <a:alphaModFix amt="35000"/>
+            <a:extLst>
+              <a:ext uri="{28A0092B-C50C-407E-A947-70E740481C1C}">
+                <a14:useLocalDpi xmlns:a14="http://schemas.microsoft.com/office/drawing/2010/main" val="0"/>
+              </a:ext>
+            </a:extLst>
+          </a:blip>
+          <a:stretch>
+            <a:fillRect/>
+          </a:stretch>
+        </p:blipFill>
+        <p:spPr>
+          <a:xfrm>
+            <a:off x="0" y="1"/>
+            <a:ext cx="12192000" cy="1392401"/>
+          </a:xfrm>
+          <a:prstGeom prst="rect">
+            <a:avLst/>
+          </a:prstGeom>
+        </p:spPr>
+      </p:pic>
+      <p:sp useBgFill="1">
+        <p:nvSpPr>
+          <p:cNvPr id="17" name="Rectangle 16">
+            <a:extLst>
+              <a:ext uri="{FF2B5EF4-FFF2-40B4-BE49-F238E27FC236}">
+                <a16:creationId xmlns:a16="http://schemas.microsoft.com/office/drawing/2014/main" id="{F1174801-1395-44C5-9B00-CCAC45C056E7}"/>
+              </a:ext>
+              <a:ext uri="{C183D7F6-B498-43B3-948B-1728B52AA6E4}">
+                <adec:decorative xmlns:adec="http://schemas.microsoft.com/office/drawing/2017/decorative" val="1"/>
+              </a:ext>
+            </a:extLst>
+          </p:cNvPr>
+          <p:cNvSpPr>
+            <a:spLocks noGrp="1" noRot="1" noChangeAspect="1" noMove="1" noResize="1" noEditPoints="1" noAdjustHandles="1" noChangeArrowheads="1" noChangeShapeType="1" noTextEdit="1"/>
+          </p:cNvSpPr>
+          <p:nvPr>
+            <p:extLst>
+              <p:ext uri="{386F3935-93C4-4BCD-93E2-E3B085C9AB24}">
+                <p16:designElem xmlns:p16="http://schemas.microsoft.com/office/powerpoint/2015/main" val="1"/>
+              </p:ext>
+            </p:extLst>
+          </p:nvPr>
+        </p:nvSpPr>
+        <p:spPr>
+          <a:xfrm>
+            <a:off x="0" y="0"/>
+            <a:ext cx="12188952" cy="6858000"/>
+          </a:xfrm>
+          <a:prstGeom prst="rect">
+            <a:avLst/>
+          </a:prstGeom>
+          <a:ln>
+            <a:noFill/>
+          </a:ln>
+        </p:spPr>
+        <p:style>
+          <a:lnRef idx="2">
+            <a:schemeClr val="accent1">
+              <a:shade val="50000"/>
+            </a:schemeClr>
+          </a:lnRef>
+          <a:fillRef idx="1">
+            <a:schemeClr val="accent1"/>
+          </a:fillRef>
+          <a:effectRef idx="0">
+            <a:schemeClr val="accent1"/>
+          </a:effectRef>
+          <a:fontRef idx="minor">
+            <a:schemeClr val="lt1"/>
+          </a:fontRef>
+        </p:style>
+        <p:txBody>
+          <a:bodyPr rtlCol="0" anchor="ctr"/>
+          <a:lstStyle/>
+          <a:p>
+            <a:pPr algn="ctr"/>
+            <a:endParaRPr lang="en-US" dirty="0">
+              <a:solidFill>
+                <a:schemeClr val="tx1">
+                  <a:lumMod val="65000"/>
+                  <a:lumOff val="35000"/>
+                </a:schemeClr>
+              </a:solidFill>
+              <a:latin typeface="AvenirNext LT Pro Medium" panose="020B0504020202020204" pitchFamily="34" charset="0"/>
+            </a:endParaRPr>
+          </a:p>
+        </p:txBody>
+      </p:sp>
+      <p:sp>
+        <p:nvSpPr>
+          <p:cNvPr id="19" name="Rectangle 18">
+            <a:extLst>
+              <a:ext uri="{FF2B5EF4-FFF2-40B4-BE49-F238E27FC236}">
+                <a16:creationId xmlns:a16="http://schemas.microsoft.com/office/drawing/2014/main" id="{8DBEE602-02D2-420A-AFC1-438A1699A5E5}"/>
+              </a:ext>
+              <a:ext uri="{C183D7F6-B498-43B3-948B-1728B52AA6E4}">
+                <adec:decorative xmlns:adec="http://schemas.microsoft.com/office/drawing/2017/decorative" val="1"/>
+              </a:ext>
+            </a:extLst>
+          </p:cNvPr>
+          <p:cNvSpPr>
+            <a:spLocks noGrp="1" noRot="1" noChangeAspect="1" noMove="1" noResize="1" noEditPoints="1" noAdjustHandles="1" noChangeArrowheads="1" noChangeShapeType="1" noTextEdit="1"/>
+          </p:cNvSpPr>
+          <p:nvPr>
+            <p:extLst>
+              <p:ext uri="{386F3935-93C4-4BCD-93E2-E3B085C9AB24}">
+                <p16:designElem xmlns:p16="http://schemas.microsoft.com/office/powerpoint/2015/main" val="1"/>
+              </p:ext>
+            </p:extLst>
+          </p:nvPr>
+        </p:nvSpPr>
+        <p:spPr>
+          <a:xfrm>
+            <a:off x="0" y="0"/>
+            <a:ext cx="12188952" cy="6858000"/>
+          </a:xfrm>
+          <a:prstGeom prst="rect">
+            <a:avLst/>
+          </a:prstGeom>
+          <a:solidFill>
+            <a:schemeClr val="bg2">
+              <a:alpha val="61000"/>
+            </a:schemeClr>
+          </a:solidFill>
+          <a:ln>
+            <a:solidFill>
+              <a:schemeClr val="bg1">
+                <a:lumMod val="95000"/>
+              </a:schemeClr>
+            </a:solidFill>
+          </a:ln>
+        </p:spPr>
+        <p:style>
+          <a:lnRef idx="2">
+            <a:schemeClr val="accent1">
+              <a:shade val="50000"/>
+            </a:schemeClr>
+          </a:lnRef>
+          <a:fillRef idx="1">
+            <a:schemeClr val="accent1"/>
+          </a:fillRef>
+          <a:effectRef idx="0">
+            <a:schemeClr val="accent1"/>
+          </a:effectRef>
+          <a:fontRef idx="minor">
+            <a:schemeClr val="lt1"/>
+          </a:fontRef>
+        </p:style>
+        <p:txBody>
+          <a:bodyPr rtlCol="0" anchor="ctr"/>
+          <a:lstStyle/>
+          <a:p>
+            <a:pPr algn="ctr"/>
+            <a:endParaRPr lang="en-US" dirty="0">
+              <a:solidFill>
+                <a:schemeClr val="tx1">
+                  <a:lumMod val="65000"/>
+                  <a:lumOff val="35000"/>
+                </a:schemeClr>
+              </a:solidFill>
+              <a:latin typeface="AvenirNext LT Pro Medium" panose="020B0504020202020204" pitchFamily="34" charset="0"/>
+            </a:endParaRPr>
+          </a:p>
+        </p:txBody>
+      </p:sp>
+      <p:sp>
+        <p:nvSpPr>
+          <p:cNvPr id="2" name="Заголовок 1">
+            <a:extLst>
+              <a:ext uri="{FF2B5EF4-FFF2-40B4-BE49-F238E27FC236}">
+                <a16:creationId xmlns:a16="http://schemas.microsoft.com/office/drawing/2014/main" id="{3AB91A21-DB58-A68D-FD9A-C7B36A43FCA5}"/>
+              </a:ext>
+            </a:extLst>
+          </p:cNvPr>
+          <p:cNvSpPr>
+            <a:spLocks noGrp="1"/>
+          </p:cNvSpPr>
+          <p:nvPr>
+            <p:ph type="title"/>
+          </p:nvPr>
+        </p:nvSpPr>
+        <p:spPr>
+          <a:xfrm>
+            <a:off x="242669" y="2315998"/>
+            <a:ext cx="3262987" cy="1392401"/>
+          </a:xfrm>
+        </p:spPr>
+        <p:txBody>
+          <a:bodyPr vert="horz" lIns="91440" tIns="45720" rIns="91440" bIns="45720" rtlCol="0" anchor="b">
+            <a:normAutofit fontScale="90000"/>
+          </a:bodyPr>
+          <a:lstStyle/>
+          <a:p>
+            <a:r>
+              <a:rPr lang="en-US" dirty="0" err="1">
+                <a:solidFill>
+                  <a:schemeClr val="tx2"/>
+                </a:solidFill>
+              </a:rPr>
+              <a:t>База</a:t>
+            </a:r>
+            <a:r>
+              <a:rPr lang="en-US" dirty="0">
+                <a:solidFill>
+                  <a:schemeClr val="tx2"/>
+                </a:solidFill>
+              </a:rPr>
+              <a:t> </a:t>
+            </a:r>
+            <a:r>
+              <a:rPr lang="en-US" dirty="0" err="1">
+                <a:solidFill>
+                  <a:schemeClr val="tx2"/>
+                </a:solidFill>
+              </a:rPr>
+              <a:t>данных</a:t>
+            </a:r>
+            <a:endParaRPr lang="en-US" dirty="0">
+              <a:solidFill>
+                <a:schemeClr val="tx2"/>
+              </a:solidFill>
+            </a:endParaRPr>
+          </a:p>
+        </p:txBody>
+      </p:sp>
+      <p:sp>
+        <p:nvSpPr>
+          <p:cNvPr id="21" name="Rectangle 20">
+            <a:extLst>
+              <a:ext uri="{FF2B5EF4-FFF2-40B4-BE49-F238E27FC236}">
+                <a16:creationId xmlns:a16="http://schemas.microsoft.com/office/drawing/2014/main" id="{B3FAB79E-1E1B-4287-B4EA-26E497404C89}"/>
+              </a:ext>
+              <a:ext uri="{C183D7F6-B498-43B3-948B-1728B52AA6E4}">
+                <adec:decorative xmlns:adec="http://schemas.microsoft.com/office/drawing/2017/decorative" val="1"/>
+              </a:ext>
+            </a:extLst>
+          </p:cNvPr>
+          <p:cNvSpPr>
+            <a:spLocks noGrp="1" noRot="1" noChangeAspect="1" noMove="1" noResize="1" noEditPoints="1" noAdjustHandles="1" noChangeArrowheads="1" noChangeShapeType="1" noTextEdit="1"/>
+          </p:cNvSpPr>
+          <p:nvPr>
+            <p:extLst>
+              <p:ext uri="{386F3935-93C4-4BCD-93E2-E3B085C9AB24}">
+                <p16:designElem xmlns:p16="http://schemas.microsoft.com/office/powerpoint/2015/main" val="1"/>
+              </p:ext>
+            </p:extLst>
+          </p:nvPr>
+        </p:nvSpPr>
+        <p:spPr>
+          <a:xfrm>
+            <a:off x="0" y="5730812"/>
+            <a:ext cx="12192000" cy="1127188"/>
+          </a:xfrm>
+          <a:prstGeom prst="rect">
+            <a:avLst/>
+          </a:prstGeom>
+          <a:solidFill>
+            <a:schemeClr val="tx2">
+              <a:lumMod val="90000"/>
+              <a:lumOff val="10000"/>
+            </a:schemeClr>
+          </a:solidFill>
+          <a:ln>
+            <a:noFill/>
+          </a:ln>
+        </p:spPr>
+        <p:style>
+          <a:lnRef idx="2">
+            <a:schemeClr val="accent1">
+              <a:shade val="50000"/>
+            </a:schemeClr>
+          </a:lnRef>
+          <a:fillRef idx="1">
+            <a:schemeClr val="accent1"/>
+          </a:fillRef>
+          <a:effectRef idx="0">
+            <a:schemeClr val="accent1"/>
+          </a:effectRef>
+          <a:fontRef idx="minor">
+            <a:schemeClr val="lt1"/>
+          </a:fontRef>
+        </p:style>
+        <p:txBody>
+          <a:bodyPr rtlCol="0" anchor="ctr"/>
+          <a:lstStyle/>
+          <a:p>
+            <a:pPr algn="ctr"/>
+            <a:endParaRPr lang="en-US" dirty="0">
+              <a:solidFill>
+                <a:schemeClr val="tx1">
+                  <a:lumMod val="65000"/>
+                  <a:lumOff val="35000"/>
+                </a:schemeClr>
+              </a:solidFill>
+              <a:latin typeface="AvenirNext LT Pro Medium" panose="020B0504020202020204" pitchFamily="34" charset="0"/>
+            </a:endParaRPr>
+          </a:p>
+        </p:txBody>
+      </p:sp>
+      <p:sp>
+        <p:nvSpPr>
+          <p:cNvPr id="23" name="Rectangle 22">
+            <a:extLst>
+              <a:ext uri="{FF2B5EF4-FFF2-40B4-BE49-F238E27FC236}">
+                <a16:creationId xmlns:a16="http://schemas.microsoft.com/office/drawing/2014/main" id="{A22256D1-A993-4D2E-943C-2E87F8BFC629}"/>
+              </a:ext>
+              <a:ext uri="{C183D7F6-B498-43B3-948B-1728B52AA6E4}">
+                <adec:decorative xmlns:adec="http://schemas.microsoft.com/office/drawing/2017/decorative" val="1"/>
+              </a:ext>
+            </a:extLst>
+          </p:cNvPr>
+          <p:cNvSpPr>
+            <a:spLocks noGrp="1" noRot="1" noChangeAspect="1" noMove="1" noResize="1" noEditPoints="1" noAdjustHandles="1" noChangeArrowheads="1" noChangeShapeType="1" noTextEdit="1"/>
+          </p:cNvSpPr>
+          <p:nvPr>
+            <p:extLst>
+              <p:ext uri="{386F3935-93C4-4BCD-93E2-E3B085C9AB24}">
+                <p16:designElem xmlns:p16="http://schemas.microsoft.com/office/powerpoint/2015/main" val="1"/>
+              </p:ext>
+            </p:extLst>
+          </p:nvPr>
+        </p:nvSpPr>
+        <p:spPr>
+          <a:xfrm rot="10800000">
+            <a:off x="-3060" y="5730813"/>
+            <a:ext cx="12191999" cy="1127186"/>
+          </a:xfrm>
+          <a:prstGeom prst="rect">
+            <a:avLst/>
+          </a:prstGeom>
+          <a:blipFill dpi="0" rotWithShape="1">
+            <a:blip r:embed="rId3">
+              <a:alphaModFix amt="20000"/>
+              <a:duotone>
+                <a:schemeClr val="accent1">
+                  <a:shade val="45000"/>
+                  <a:satMod val="135000"/>
+                </a:schemeClr>
+                <a:prstClr val="white"/>
+              </a:duotone>
+            </a:blip>
+            <a:srcRect/>
+            <a:tile tx="889000" ty="0" sx="100000" sy="100000" flip="none" algn="tl"/>
+          </a:blipFill>
+          <a:ln>
+            <a:noFill/>
+          </a:ln>
+        </p:spPr>
+        <p:style>
+          <a:lnRef idx="2">
+            <a:schemeClr val="accent1">
+              <a:shade val="50000"/>
+            </a:schemeClr>
+          </a:lnRef>
+          <a:fillRef idx="1">
+            <a:schemeClr val="accent1"/>
+          </a:fillRef>
+          <a:effectRef idx="0">
+            <a:schemeClr val="accent1"/>
+          </a:effectRef>
+          <a:fontRef idx="minor">
+            <a:schemeClr val="lt1"/>
+          </a:fontRef>
+        </p:style>
+        <p:txBody>
+          <a:bodyPr rtlCol="0" anchor="ctr"/>
+          <a:lstStyle/>
+          <a:p>
+            <a:pPr algn="ctr"/>
+            <a:endParaRPr lang="en-US" dirty="0"/>
+          </a:p>
+        </p:txBody>
+      </p:sp>
+      <p:pic>
+        <p:nvPicPr>
+          <p:cNvPr id="8" name="Объект 4" descr="Изображение выглядит как текст, диаграмма, Параллельный, документ&#10;&#10;Автоматически созданное описание">
+            <a:extLst>
+              <a:ext uri="{FF2B5EF4-FFF2-40B4-BE49-F238E27FC236}">
+                <a16:creationId xmlns:a16="http://schemas.microsoft.com/office/drawing/2014/main" id="{E5DC6659-748B-A87B-0EED-5327E18E4AE2}"/>
+              </a:ext>
+            </a:extLst>
+          </p:cNvPr>
+          <p:cNvPicPr>
+            <a:picLocks noGrp="1" noChangeAspect="1"/>
+          </p:cNvPicPr>
+          <p:nvPr>
+            <p:ph idx="1"/>
+          </p:nvPr>
+        </p:nvPicPr>
+        <p:blipFill>
+          <a:blip r:embed="rId4">
+            <a:extLst>
+              <a:ext uri="{28A0092B-C50C-407E-A947-70E740481C1C}">
+                <a14:useLocalDpi xmlns:a14="http://schemas.microsoft.com/office/drawing/2010/main" val="0"/>
+              </a:ext>
+            </a:extLst>
+          </a:blip>
+          <a:stretch>
+            <a:fillRect/>
+          </a:stretch>
+        </p:blipFill>
+        <p:spPr>
+          <a:xfrm>
+            <a:off x="3748325" y="0"/>
+            <a:ext cx="8440614" cy="6858000"/>
+          </a:xfrm>
+          <a:prstGeom prst="rect">
+            <a:avLst/>
+          </a:prstGeom>
+        </p:spPr>
+      </p:pic>
+    </p:spTree>
+    <p:extLst>
+      <p:ext uri="{BB962C8B-B14F-4D97-AF65-F5344CB8AC3E}">
+        <p14:creationId xmlns:p14="http://schemas.microsoft.com/office/powerpoint/2010/main" val="3284122077"/>
+      </p:ext>
+    </p:extLst>
+  </p:cSld>
+  <p:clrMapOvr>
+    <a:masterClrMapping/>
+  </p:clrMapOvr>
+</p:sld>
+</file>
+
+<file path=ppt/slides/slide13.xml><?xml version="1.0" encoding="utf-8"?>
+<p:sld xmlns:a="http://schemas.openxmlformats.org/drawingml/2006/main" xmlns:r="http://schemas.openxmlformats.org/officeDocument/2006/relationships" xmlns:p="http://schemas.openxmlformats.org/presentationml/2006/main">
+  <p:cSld>
+    <p:bg>
+      <p:bgPr>
+        <a:solidFill>
+          <a:schemeClr val="bg1"/>
+        </a:solidFill>
+        <a:effectLst/>
+      </p:bgPr>
+    </p:bg>
+    <p:spTree>
+      <p:nvGrpSpPr>
+        <p:cNvPr id="1" name=""/>
+        <p:cNvGrpSpPr/>
+        <p:nvPr/>
+      </p:nvGrpSpPr>
+      <p:grpSpPr>
+        <a:xfrm>
+          <a:off x="0" y="0"/>
+          <a:ext cx="0" cy="0"/>
+          <a:chOff x="0" y="0"/>
+          <a:chExt cx="0" cy="0"/>
+        </a:xfrm>
+      </p:grpSpPr>
+      <p:sp useBgFill="1">
+        <p:nvSpPr>
           <p:cNvPr id="28" name="Rectangle 19">
             <a:extLst>
               <a:ext uri="{FF2B5EF4-FFF2-40B4-BE49-F238E27FC236}">
@@ -10786,7 +12259,7 @@
 </p:sld>
 </file>
 
-<file path=ppt/slides/slide11.xml><?xml version="1.0" encoding="utf-8"?>
+<file path=ppt/slides/slide14.xml><?xml version="1.0" encoding="utf-8"?>
 <p:sld xmlns:a="http://schemas.openxmlformats.org/drawingml/2006/main" xmlns:r="http://schemas.openxmlformats.org/officeDocument/2006/relationships" xmlns:p="http://schemas.openxmlformats.org/presentationml/2006/main">
   <p:cSld>
     <p:bg>
@@ -13716,36 +15189,6 @@
           </a:p>
         </p:txBody>
       </p:sp>
-      <p:pic>
-        <p:nvPicPr>
-          <p:cNvPr id="17" name="Рисунок 16">
-            <a:extLst>
-              <a:ext uri="{FF2B5EF4-FFF2-40B4-BE49-F238E27FC236}">
-                <a16:creationId xmlns:a16="http://schemas.microsoft.com/office/drawing/2014/main" id="{30529F5A-A8BE-CB9F-89B6-FC2FB4445940}"/>
-              </a:ext>
-            </a:extLst>
-          </p:cNvPr>
-          <p:cNvPicPr>
-            <a:picLocks noChangeAspect="1"/>
-          </p:cNvPicPr>
-          <p:nvPr/>
-        </p:nvPicPr>
-        <p:blipFill>
-          <a:blip r:embed="rId3"/>
-          <a:stretch>
-            <a:fillRect/>
-          </a:stretch>
-        </p:blipFill>
-        <p:spPr>
-          <a:xfrm>
-            <a:off x="105285" y="330679"/>
-            <a:ext cx="6345678" cy="4253125"/>
-          </a:xfrm>
-          <a:prstGeom prst="rect">
-            <a:avLst/>
-          </a:prstGeom>
-        </p:spPr>
-      </p:pic>
       <p:sp>
         <p:nvSpPr>
           <p:cNvPr id="3" name="Объект 2">
@@ -13823,6 +15266,42 @@
           </a:p>
         </p:txBody>
       </p:sp>
+      <p:pic>
+        <p:nvPicPr>
+          <p:cNvPr id="5" name="Рисунок 4">
+            <a:extLst>
+              <a:ext uri="{FF2B5EF4-FFF2-40B4-BE49-F238E27FC236}">
+                <a16:creationId xmlns:a16="http://schemas.microsoft.com/office/drawing/2014/main" id="{E771AB7D-F19D-48FF-9B5E-50E80E2AA0DF}"/>
+              </a:ext>
+            </a:extLst>
+          </p:cNvPr>
+          <p:cNvPicPr>
+            <a:picLocks noChangeAspect="1"/>
+          </p:cNvPicPr>
+          <p:nvPr/>
+        </p:nvPicPr>
+        <p:blipFill>
+          <a:blip r:embed="rId3">
+            <a:extLst>
+              <a:ext uri="{28A0092B-C50C-407E-A947-70E740481C1C}">
+                <a14:useLocalDpi xmlns:a14="http://schemas.microsoft.com/office/drawing/2010/main" val="0"/>
+              </a:ext>
+            </a:extLst>
+          </a:blip>
+          <a:stretch>
+            <a:fillRect/>
+          </a:stretch>
+        </p:blipFill>
+        <p:spPr>
+          <a:xfrm>
+            <a:off x="0" y="399684"/>
+            <a:ext cx="6589488" cy="3938740"/>
+          </a:xfrm>
+          <a:prstGeom prst="rect">
+            <a:avLst/>
+          </a:prstGeom>
+        </p:spPr>
+      </p:pic>
     </p:spTree>
     <p:extLst>
       <p:ext uri="{BB962C8B-B14F-4D97-AF65-F5344CB8AC3E}">
@@ -13837,6 +15316,314 @@
 </file>
 
 <file path=ppt/slides/slide5.xml><?xml version="1.0" encoding="utf-8"?>
+<p:sld xmlns:a="http://schemas.openxmlformats.org/drawingml/2006/main" xmlns:r="http://schemas.openxmlformats.org/officeDocument/2006/relationships" xmlns:p="http://schemas.openxmlformats.org/presentationml/2006/main">
+  <p:cSld>
+    <p:spTree>
+      <p:nvGrpSpPr>
+        <p:cNvPr id="1" name=""/>
+        <p:cNvGrpSpPr/>
+        <p:nvPr/>
+      </p:nvGrpSpPr>
+      <p:grpSpPr>
+        <a:xfrm>
+          <a:off x="0" y="0"/>
+          <a:ext cx="0" cy="0"/>
+          <a:chOff x="0" y="0"/>
+          <a:chExt cx="0" cy="0"/>
+        </a:xfrm>
+      </p:grpSpPr>
+      <p:sp>
+        <p:nvSpPr>
+          <p:cNvPr id="2" name="Заголовок 1">
+            <a:extLst>
+              <a:ext uri="{FF2B5EF4-FFF2-40B4-BE49-F238E27FC236}">
+                <a16:creationId xmlns:a16="http://schemas.microsoft.com/office/drawing/2014/main" id="{E11CBECA-E02D-4933-8D71-F59D81E58604}"/>
+              </a:ext>
+            </a:extLst>
+          </p:cNvPr>
+          <p:cNvSpPr>
+            <a:spLocks noGrp="1"/>
+          </p:cNvSpPr>
+          <p:nvPr>
+            <p:ph type="title"/>
+          </p:nvPr>
+        </p:nvSpPr>
+        <p:spPr/>
+        <p:txBody>
+          <a:bodyPr>
+            <a:normAutofit fontScale="90000"/>
+          </a:bodyPr>
+          <a:lstStyle/>
+          <a:p>
+            <a:pPr algn="ctr"/>
+            <a:r>
+              <a:rPr lang="ru-RU" dirty="0"/>
+              <a:t>Подробная схема по взаимодействию </a:t>
+            </a:r>
+            <a:r>
+              <a:rPr lang="ru-RU" dirty="0" err="1"/>
+              <a:t>микросервисов</a:t>
+            </a:r>
+            <a:r>
+              <a:rPr lang="ru-RU" dirty="0"/>
+              <a:t> (дополняется)</a:t>
+            </a:r>
+          </a:p>
+        </p:txBody>
+      </p:sp>
+      <p:pic>
+        <p:nvPicPr>
+          <p:cNvPr id="7" name="Объект 6">
+            <a:extLst>
+              <a:ext uri="{FF2B5EF4-FFF2-40B4-BE49-F238E27FC236}">
+                <a16:creationId xmlns:a16="http://schemas.microsoft.com/office/drawing/2014/main" id="{7D8E1C4D-CD78-4653-8E07-AF28A17FB3AC}"/>
+              </a:ext>
+            </a:extLst>
+          </p:cNvPr>
+          <p:cNvPicPr>
+            <a:picLocks noGrp="1" noChangeAspect="1"/>
+          </p:cNvPicPr>
+          <p:nvPr>
+            <p:ph idx="1"/>
+          </p:nvPr>
+        </p:nvPicPr>
+        <p:blipFill>
+          <a:blip r:embed="rId2">
+            <a:extLst>
+              <a:ext uri="{28A0092B-C50C-407E-A947-70E740481C1C}">
+                <a14:useLocalDpi xmlns:a14="http://schemas.microsoft.com/office/drawing/2010/main" val="0"/>
+              </a:ext>
+            </a:extLst>
+          </a:blip>
+          <a:stretch>
+            <a:fillRect/>
+          </a:stretch>
+        </p:blipFill>
+        <p:spPr>
+          <a:xfrm>
+            <a:off x="102555" y="1810222"/>
+            <a:ext cx="11959612" cy="4682018"/>
+          </a:xfrm>
+        </p:spPr>
+      </p:pic>
+    </p:spTree>
+    <p:extLst>
+      <p:ext uri="{BB962C8B-B14F-4D97-AF65-F5344CB8AC3E}">
+        <p14:creationId xmlns:p14="http://schemas.microsoft.com/office/powerpoint/2010/main" val="401893368"/>
+      </p:ext>
+    </p:extLst>
+  </p:cSld>
+  <p:clrMapOvr>
+    <a:masterClrMapping/>
+  </p:clrMapOvr>
+</p:sld>
+</file>
+
+<file path=ppt/slides/slide6.xml><?xml version="1.0" encoding="utf-8"?>
+<p:sld xmlns:a="http://schemas.openxmlformats.org/drawingml/2006/main" xmlns:r="http://schemas.openxmlformats.org/officeDocument/2006/relationships" xmlns:p="http://schemas.openxmlformats.org/presentationml/2006/main">
+  <p:cSld>
+    <p:spTree>
+      <p:nvGrpSpPr>
+        <p:cNvPr id="1" name=""/>
+        <p:cNvGrpSpPr/>
+        <p:nvPr/>
+      </p:nvGrpSpPr>
+      <p:grpSpPr>
+        <a:xfrm>
+          <a:off x="0" y="0"/>
+          <a:ext cx="0" cy="0"/>
+          <a:chOff x="0" y="0"/>
+          <a:chExt cx="0" cy="0"/>
+        </a:xfrm>
+      </p:grpSpPr>
+      <p:sp>
+        <p:nvSpPr>
+          <p:cNvPr id="2" name="Заголовок 1">
+            <a:extLst>
+              <a:ext uri="{FF2B5EF4-FFF2-40B4-BE49-F238E27FC236}">
+                <a16:creationId xmlns:a16="http://schemas.microsoft.com/office/drawing/2014/main" id="{7E85FFE9-25FF-4DDE-9B35-8FE390D9CF21}"/>
+              </a:ext>
+            </a:extLst>
+          </p:cNvPr>
+          <p:cNvSpPr>
+            <a:spLocks noGrp="1"/>
+          </p:cNvSpPr>
+          <p:nvPr>
+            <p:ph type="title"/>
+          </p:nvPr>
+        </p:nvSpPr>
+        <p:spPr/>
+        <p:txBody>
+          <a:bodyPr/>
+          <a:lstStyle/>
+          <a:p>
+            <a:pPr algn="ctr"/>
+            <a:r>
+              <a:rPr lang="ru-RU" dirty="0"/>
+              <a:t>Внутренняя структура </a:t>
+            </a:r>
+            <a:r>
+              <a:rPr lang="ru-RU" dirty="0" err="1"/>
+              <a:t>микросервиса</a:t>
+            </a:r>
+            <a:endParaRPr lang="ru-RU" dirty="0"/>
+          </a:p>
+        </p:txBody>
+      </p:sp>
+      <p:pic>
+        <p:nvPicPr>
+          <p:cNvPr id="5" name="Объект 4">
+            <a:extLst>
+              <a:ext uri="{FF2B5EF4-FFF2-40B4-BE49-F238E27FC236}">
+                <a16:creationId xmlns:a16="http://schemas.microsoft.com/office/drawing/2014/main" id="{BF1483E1-6FC5-443A-872D-A5E873775C3A}"/>
+              </a:ext>
+            </a:extLst>
+          </p:cNvPr>
+          <p:cNvPicPr>
+            <a:picLocks noGrp="1" noChangeAspect="1"/>
+          </p:cNvPicPr>
+          <p:nvPr>
+            <p:ph idx="1"/>
+          </p:nvPr>
+        </p:nvPicPr>
+        <p:blipFill>
+          <a:blip r:embed="rId2">
+            <a:extLst>
+              <a:ext uri="{28A0092B-C50C-407E-A947-70E740481C1C}">
+                <a14:useLocalDpi xmlns:a14="http://schemas.microsoft.com/office/drawing/2010/main" val="0"/>
+              </a:ext>
+            </a:extLst>
+          </a:blip>
+          <a:stretch>
+            <a:fillRect/>
+          </a:stretch>
+        </p:blipFill>
+        <p:spPr>
+          <a:xfrm>
+            <a:off x="285919" y="2116827"/>
+            <a:ext cx="11620161" cy="3314572"/>
+          </a:xfrm>
+        </p:spPr>
+      </p:pic>
+    </p:spTree>
+    <p:extLst>
+      <p:ext uri="{BB962C8B-B14F-4D97-AF65-F5344CB8AC3E}">
+        <p14:creationId xmlns:p14="http://schemas.microsoft.com/office/powerpoint/2010/main" val="1438549750"/>
+      </p:ext>
+    </p:extLst>
+  </p:cSld>
+  <p:clrMapOvr>
+    <a:masterClrMapping/>
+  </p:clrMapOvr>
+</p:sld>
+</file>
+
+<file path=ppt/slides/slide7.xml><?xml version="1.0" encoding="utf-8"?>
+<p:sld xmlns:a="http://schemas.openxmlformats.org/drawingml/2006/main" xmlns:r="http://schemas.openxmlformats.org/officeDocument/2006/relationships" xmlns:p="http://schemas.openxmlformats.org/presentationml/2006/main">
+  <p:cSld>
+    <p:spTree>
+      <p:nvGrpSpPr>
+        <p:cNvPr id="1" name=""/>
+        <p:cNvGrpSpPr/>
+        <p:nvPr/>
+      </p:nvGrpSpPr>
+      <p:grpSpPr>
+        <a:xfrm>
+          <a:off x="0" y="0"/>
+          <a:ext cx="0" cy="0"/>
+          <a:chOff x="0" y="0"/>
+          <a:chExt cx="0" cy="0"/>
+        </a:xfrm>
+      </p:grpSpPr>
+      <p:sp>
+        <p:nvSpPr>
+          <p:cNvPr id="2" name="Заголовок 1">
+            <a:extLst>
+              <a:ext uri="{FF2B5EF4-FFF2-40B4-BE49-F238E27FC236}">
+                <a16:creationId xmlns:a16="http://schemas.microsoft.com/office/drawing/2014/main" id="{449611A5-90EB-4AA1-B6A8-948E15018587}"/>
+              </a:ext>
+            </a:extLst>
+          </p:cNvPr>
+          <p:cNvSpPr>
+            <a:spLocks noGrp="1"/>
+          </p:cNvSpPr>
+          <p:nvPr>
+            <p:ph type="title"/>
+          </p:nvPr>
+        </p:nvSpPr>
+        <p:spPr>
+          <a:xfrm>
+            <a:off x="838200" y="132004"/>
+            <a:ext cx="10515600" cy="1325563"/>
+          </a:xfrm>
+        </p:spPr>
+        <p:txBody>
+          <a:bodyPr/>
+          <a:lstStyle/>
+          <a:p>
+            <a:pPr algn="ctr"/>
+            <a:r>
+              <a:rPr lang="ru-RU" dirty="0"/>
+              <a:t>Компоненты архитектуры </a:t>
+            </a:r>
+            <a:r>
+              <a:rPr lang="ru-RU" dirty="0" err="1"/>
+              <a:t>микросервиса</a:t>
+            </a:r>
+            <a:endParaRPr lang="ru-RU" dirty="0"/>
+          </a:p>
+        </p:txBody>
+      </p:sp>
+      <p:pic>
+        <p:nvPicPr>
+          <p:cNvPr id="7" name="Рисунок 6">
+            <a:extLst>
+              <a:ext uri="{FF2B5EF4-FFF2-40B4-BE49-F238E27FC236}">
+                <a16:creationId xmlns:a16="http://schemas.microsoft.com/office/drawing/2014/main" id="{D2A91FBB-63ED-4CC8-9AA8-CCA3628834DB}"/>
+              </a:ext>
+            </a:extLst>
+          </p:cNvPr>
+          <p:cNvPicPr>
+            <a:picLocks noChangeAspect="1"/>
+          </p:cNvPicPr>
+          <p:nvPr/>
+        </p:nvPicPr>
+        <p:blipFill>
+          <a:blip r:embed="rId2">
+            <a:extLst>
+              <a:ext uri="{28A0092B-C50C-407E-A947-70E740481C1C}">
+                <a14:useLocalDpi xmlns:a14="http://schemas.microsoft.com/office/drawing/2010/main" val="0"/>
+              </a:ext>
+            </a:extLst>
+          </a:blip>
+          <a:stretch>
+            <a:fillRect/>
+          </a:stretch>
+        </p:blipFill>
+        <p:spPr>
+          <a:xfrm>
+            <a:off x="558740" y="1389469"/>
+            <a:ext cx="11074520" cy="5396341"/>
+          </a:xfrm>
+          <a:prstGeom prst="rect">
+            <a:avLst/>
+          </a:prstGeom>
+        </p:spPr>
+      </p:pic>
+    </p:spTree>
+    <p:extLst>
+      <p:ext uri="{BB962C8B-B14F-4D97-AF65-F5344CB8AC3E}">
+        <p14:creationId xmlns:p14="http://schemas.microsoft.com/office/powerpoint/2010/main" val="2412625938"/>
+      </p:ext>
+    </p:extLst>
+  </p:cSld>
+  <p:clrMapOvr>
+    <a:masterClrMapping/>
+  </p:clrMapOvr>
+</p:sld>
+</file>
+
+<file path=ppt/slides/slide8.xml><?xml version="1.0" encoding="utf-8"?>
 <p:sld xmlns:a="http://schemas.openxmlformats.org/drawingml/2006/main" xmlns:r="http://schemas.openxmlformats.org/officeDocument/2006/relationships" xmlns:p="http://schemas.openxmlformats.org/presentationml/2006/main">
   <p:cSld>
     <p:bg>
@@ -14225,7 +16012,7 @@
 </p:sld>
 </file>
 
-<file path=ppt/slides/slide6.xml><?xml version="1.0" encoding="utf-8"?>
+<file path=ppt/slides/slide9.xml><?xml version="1.0" encoding="utf-8"?>
 <p:sld xmlns:a="http://schemas.openxmlformats.org/drawingml/2006/main" xmlns:r="http://schemas.openxmlformats.org/officeDocument/2006/relationships" xmlns:p="http://schemas.openxmlformats.org/presentationml/2006/main">
   <p:cSld>
     <p:bg>
@@ -14635,1471 +16422,6 @@
     <p:extLst>
       <p:ext uri="{BB962C8B-B14F-4D97-AF65-F5344CB8AC3E}">
         <p14:creationId xmlns:p14="http://schemas.microsoft.com/office/powerpoint/2010/main" val="1551718275"/>
-      </p:ext>
-    </p:extLst>
-  </p:cSld>
-  <p:clrMapOvr>
-    <a:masterClrMapping/>
-  </p:clrMapOvr>
-</p:sld>
-</file>
-
-<file path=ppt/slides/slide7.xml><?xml version="1.0" encoding="utf-8"?>
-<p:sld xmlns:a="http://schemas.openxmlformats.org/drawingml/2006/main" xmlns:r="http://schemas.openxmlformats.org/officeDocument/2006/relationships" xmlns:p="http://schemas.openxmlformats.org/presentationml/2006/main">
-  <p:cSld>
-    <p:bg>
-      <p:bgPr>
-        <a:solidFill>
-          <a:schemeClr val="bg1"/>
-        </a:solidFill>
-        <a:effectLst/>
-      </p:bgPr>
-    </p:bg>
-    <p:spTree>
-      <p:nvGrpSpPr>
-        <p:cNvPr id="1" name=""/>
-        <p:cNvGrpSpPr/>
-        <p:nvPr/>
-      </p:nvGrpSpPr>
-      <p:grpSpPr>
-        <a:xfrm>
-          <a:off x="0" y="0"/>
-          <a:ext cx="0" cy="0"/>
-          <a:chOff x="0" y="0"/>
-          <a:chExt cx="0" cy="0"/>
-        </a:xfrm>
-      </p:grpSpPr>
-      <p:sp useBgFill="1">
-        <p:nvSpPr>
-          <p:cNvPr id="28" name="Rectangle 27">
-            <a:extLst>
-              <a:ext uri="{FF2B5EF4-FFF2-40B4-BE49-F238E27FC236}">
-                <a16:creationId xmlns:a16="http://schemas.microsoft.com/office/drawing/2014/main" id="{8651CFA9-6065-4243-AC48-858E359780B1}"/>
-              </a:ext>
-              <a:ext uri="{C183D7F6-B498-43B3-948B-1728B52AA6E4}">
-                <adec:decorative xmlns:adec="http://schemas.microsoft.com/office/drawing/2017/decorative" val="1"/>
-              </a:ext>
-            </a:extLst>
-          </p:cNvPr>
-          <p:cNvSpPr>
-            <a:spLocks noGrp="1" noRot="1" noChangeAspect="1" noMove="1" noResize="1" noEditPoints="1" noAdjustHandles="1" noChangeArrowheads="1" noChangeShapeType="1" noTextEdit="1"/>
-          </p:cNvSpPr>
-          <p:nvPr>
-            <p:extLst>
-              <p:ext uri="{386F3935-93C4-4BCD-93E2-E3B085C9AB24}">
-                <p16:designElem xmlns:p16="http://schemas.microsoft.com/office/powerpoint/2015/main" val="1"/>
-              </p:ext>
-            </p:extLst>
-          </p:nvPr>
-        </p:nvSpPr>
-        <p:spPr>
-          <a:xfrm>
-            <a:off x="0" y="0"/>
-            <a:ext cx="12188952" cy="6858000"/>
-          </a:xfrm>
-          <a:prstGeom prst="rect">
-            <a:avLst/>
-          </a:prstGeom>
-          <a:ln>
-            <a:noFill/>
-          </a:ln>
-        </p:spPr>
-        <p:style>
-          <a:lnRef idx="2">
-            <a:schemeClr val="accent1">
-              <a:shade val="50000"/>
-            </a:schemeClr>
-          </a:lnRef>
-          <a:fillRef idx="1">
-            <a:schemeClr val="accent1"/>
-          </a:fillRef>
-          <a:effectRef idx="0">
-            <a:schemeClr val="accent1"/>
-          </a:effectRef>
-          <a:fontRef idx="minor">
-            <a:schemeClr val="lt1"/>
-          </a:fontRef>
-        </p:style>
-        <p:txBody>
-          <a:bodyPr rtlCol="0" anchor="ctr"/>
-          <a:lstStyle/>
-          <a:p>
-            <a:pPr algn="ctr"/>
-            <a:endParaRPr lang="en-US" dirty="0">
-              <a:solidFill>
-                <a:schemeClr val="tx1">
-                  <a:lumMod val="65000"/>
-                  <a:lumOff val="35000"/>
-                </a:schemeClr>
-              </a:solidFill>
-              <a:latin typeface="AvenirNext LT Pro Medium" panose="020B0504020202020204" pitchFamily="34" charset="0"/>
-            </a:endParaRPr>
-          </a:p>
-        </p:txBody>
-      </p:sp>
-      <p:sp>
-        <p:nvSpPr>
-          <p:cNvPr id="30" name="Rectangle 29">
-            <a:extLst>
-              <a:ext uri="{FF2B5EF4-FFF2-40B4-BE49-F238E27FC236}">
-                <a16:creationId xmlns:a16="http://schemas.microsoft.com/office/drawing/2014/main" id="{5A8C81AE-8F0D-49F3-9FB4-334B0DCDF195}"/>
-              </a:ext>
-              <a:ext uri="{C183D7F6-B498-43B3-948B-1728B52AA6E4}">
-                <adec:decorative xmlns:adec="http://schemas.microsoft.com/office/drawing/2017/decorative" val="1"/>
-              </a:ext>
-            </a:extLst>
-          </p:cNvPr>
-          <p:cNvSpPr>
-            <a:spLocks noGrp="1" noRot="1" noChangeAspect="1" noMove="1" noResize="1" noEditPoints="1" noAdjustHandles="1" noChangeArrowheads="1" noChangeShapeType="1" noTextEdit="1"/>
-          </p:cNvSpPr>
-          <p:nvPr>
-            <p:extLst>
-              <p:ext uri="{386F3935-93C4-4BCD-93E2-E3B085C9AB24}">
-                <p16:designElem xmlns:p16="http://schemas.microsoft.com/office/powerpoint/2015/main" val="1"/>
-              </p:ext>
-            </p:extLst>
-          </p:nvPr>
-        </p:nvSpPr>
-        <p:spPr>
-          <a:xfrm>
-            <a:off x="3048" y="0"/>
-            <a:ext cx="12188952" cy="6858000"/>
-          </a:xfrm>
-          <a:prstGeom prst="rect">
-            <a:avLst/>
-          </a:prstGeom>
-          <a:solidFill>
-            <a:schemeClr val="bg2">
-              <a:alpha val="70000"/>
-            </a:schemeClr>
-          </a:solidFill>
-          <a:ln>
-            <a:noFill/>
-          </a:ln>
-        </p:spPr>
-        <p:style>
-          <a:lnRef idx="2">
-            <a:schemeClr val="accent1">
-              <a:shade val="50000"/>
-            </a:schemeClr>
-          </a:lnRef>
-          <a:fillRef idx="1">
-            <a:schemeClr val="accent1"/>
-          </a:fillRef>
-          <a:effectRef idx="0">
-            <a:schemeClr val="accent1"/>
-          </a:effectRef>
-          <a:fontRef idx="minor">
-            <a:schemeClr val="lt1"/>
-          </a:fontRef>
-        </p:style>
-        <p:txBody>
-          <a:bodyPr rtlCol="0" anchor="ctr"/>
-          <a:lstStyle/>
-          <a:p>
-            <a:pPr algn="ctr"/>
-            <a:endParaRPr lang="en-US">
-              <a:solidFill>
-                <a:schemeClr val="tx1">
-                  <a:lumMod val="65000"/>
-                  <a:lumOff val="35000"/>
-                </a:schemeClr>
-              </a:solidFill>
-              <a:latin typeface="AvenirNext LT Pro Medium" panose="020B0504020202020204" pitchFamily="34" charset="0"/>
-            </a:endParaRPr>
-          </a:p>
-        </p:txBody>
-      </p:sp>
-      <p:pic>
-        <p:nvPicPr>
-          <p:cNvPr id="32" name="Picture 31">
-            <a:extLst>
-              <a:ext uri="{FF2B5EF4-FFF2-40B4-BE49-F238E27FC236}">
-                <a16:creationId xmlns:a16="http://schemas.microsoft.com/office/drawing/2014/main" id="{29DA4B2B-B54E-43B4-A1A4-EB704F7F3D41}"/>
-              </a:ext>
-              <a:ext uri="{C183D7F6-B498-43B3-948B-1728B52AA6E4}">
-                <adec:decorative xmlns:adec="http://schemas.microsoft.com/office/drawing/2017/decorative" val="1"/>
-              </a:ext>
-            </a:extLst>
-          </p:cNvPr>
-          <p:cNvPicPr>
-            <a:picLocks noGrp="1" noRot="1" noChangeAspect="1" noMove="1" noResize="1" noEditPoints="1" noAdjustHandles="1" noChangeArrowheads="1" noChangeShapeType="1" noCrop="1"/>
-          </p:cNvPicPr>
-          <p:nvPr>
-            <p:extLst>
-              <p:ext uri="{386F3935-93C4-4BCD-93E2-E3B085C9AB24}">
-                <p16:designElem xmlns:p16="http://schemas.microsoft.com/office/powerpoint/2015/main" val="1"/>
-              </p:ext>
-            </p:extLst>
-          </p:nvPr>
-        </p:nvPicPr>
-        <p:blipFill rotWithShape="1">
-          <a:blip r:embed="rId2">
-            <a:duotone>
-              <a:schemeClr val="accent1">
-                <a:shade val="45000"/>
-                <a:satMod val="135000"/>
-              </a:schemeClr>
-              <a:prstClr val="white"/>
-            </a:duotone>
-            <a:extLst>
-              <a:ext uri="{28A0092B-C50C-407E-A947-70E740481C1C}">
-                <a14:useLocalDpi xmlns:a14="http://schemas.microsoft.com/office/drawing/2010/main" val="0"/>
-              </a:ext>
-            </a:extLst>
-          </a:blip>
-          <a:srcRect l="53001" t="54841" r="-1"/>
-          <a:stretch/>
-        </p:blipFill>
-        <p:spPr>
-          <a:xfrm>
-            <a:off x="0" y="0"/>
-            <a:ext cx="872377" cy="838200"/>
-          </a:xfrm>
-          <a:prstGeom prst="rect">
-            <a:avLst/>
-          </a:prstGeom>
-        </p:spPr>
-      </p:pic>
-      <p:sp>
-        <p:nvSpPr>
-          <p:cNvPr id="2" name="Заголовок 1">
-            <a:extLst>
-              <a:ext uri="{FF2B5EF4-FFF2-40B4-BE49-F238E27FC236}">
-                <a16:creationId xmlns:a16="http://schemas.microsoft.com/office/drawing/2014/main" id="{3374C866-6804-4DB6-71B2-8547BF24B0D5}"/>
-              </a:ext>
-            </a:extLst>
-          </p:cNvPr>
-          <p:cNvSpPr>
-            <a:spLocks noGrp="1"/>
-          </p:cNvSpPr>
-          <p:nvPr>
-            <p:ph type="title"/>
-          </p:nvPr>
-        </p:nvSpPr>
-        <p:spPr>
-          <a:xfrm>
-            <a:off x="838200" y="559813"/>
-            <a:ext cx="5638800" cy="1573786"/>
-          </a:xfrm>
-        </p:spPr>
-        <p:txBody>
-          <a:bodyPr vert="horz" lIns="91440" tIns="45720" rIns="91440" bIns="45720" rtlCol="0">
-            <a:normAutofit/>
-          </a:bodyPr>
-          <a:lstStyle/>
-          <a:p>
-            <a:r>
-              <a:rPr lang="en-US">
-                <a:solidFill>
-                  <a:schemeClr val="tx2"/>
-                </a:solidFill>
-              </a:rPr>
-              <a:t>Администраторская панель</a:t>
-            </a:r>
-          </a:p>
-        </p:txBody>
-      </p:sp>
-      <p:sp>
-        <p:nvSpPr>
-          <p:cNvPr id="7" name="Объект 6">
-            <a:extLst>
-              <a:ext uri="{FF2B5EF4-FFF2-40B4-BE49-F238E27FC236}">
-                <a16:creationId xmlns:a16="http://schemas.microsoft.com/office/drawing/2014/main" id="{6A24702A-D99B-B4D9-0E60-4B051C89C1DA}"/>
-              </a:ext>
-            </a:extLst>
-          </p:cNvPr>
-          <p:cNvSpPr>
-            <a:spLocks noGrp="1"/>
-          </p:cNvSpPr>
-          <p:nvPr>
-            <p:ph idx="1"/>
-          </p:nvPr>
-        </p:nvSpPr>
-        <p:spPr>
-          <a:xfrm>
-            <a:off x="6687160" y="559814"/>
-            <a:ext cx="4633486" cy="1573786"/>
-          </a:xfrm>
-        </p:spPr>
-        <p:txBody>
-          <a:bodyPr vert="horz" lIns="91440" tIns="45720" rIns="91440" bIns="45720" rtlCol="0">
-            <a:normAutofit/>
-          </a:bodyPr>
-          <a:lstStyle/>
-          <a:p>
-            <a:pPr marL="0" indent="0">
-              <a:buNone/>
-            </a:pPr>
-            <a:r>
-              <a:rPr lang="ru-RU" sz="1800" dirty="0">
-                <a:solidFill>
-                  <a:schemeClr val="tx2"/>
-                </a:solidFill>
-              </a:rPr>
-              <a:t>Создание</a:t>
-            </a:r>
-            <a:r>
-              <a:rPr lang="en-US" sz="1800" dirty="0">
-                <a:solidFill>
-                  <a:schemeClr val="tx2"/>
-                </a:solidFill>
-              </a:rPr>
-              <a:t> </a:t>
-            </a:r>
-            <a:r>
-              <a:rPr lang="ru-RU" sz="1800" dirty="0">
-                <a:solidFill>
-                  <a:schemeClr val="tx2"/>
-                </a:solidFill>
-              </a:rPr>
-              <a:t>администраторской панели для управления событиями и пользователями</a:t>
-            </a:r>
-            <a:endParaRPr lang="en-US" sz="1800" dirty="0">
-              <a:solidFill>
-                <a:schemeClr val="tx2"/>
-              </a:solidFill>
-            </a:endParaRPr>
-          </a:p>
-        </p:txBody>
-      </p:sp>
-      <p:pic>
-        <p:nvPicPr>
-          <p:cNvPr id="8" name="Объект 4">
-            <a:extLst>
-              <a:ext uri="{FF2B5EF4-FFF2-40B4-BE49-F238E27FC236}">
-                <a16:creationId xmlns:a16="http://schemas.microsoft.com/office/drawing/2014/main" id="{E7071738-7A18-AD75-98B9-1185AB4B87C0}"/>
-              </a:ext>
-            </a:extLst>
-          </p:cNvPr>
-          <p:cNvPicPr>
-            <a:picLocks noChangeAspect="1"/>
-          </p:cNvPicPr>
-          <p:nvPr/>
-        </p:nvPicPr>
-        <p:blipFill>
-          <a:blip r:embed="rId3"/>
-          <a:stretch>
-            <a:fillRect/>
-          </a:stretch>
-        </p:blipFill>
-        <p:spPr>
-          <a:xfrm>
-            <a:off x="2362958" y="2385716"/>
-            <a:ext cx="7466084" cy="3919694"/>
-          </a:xfrm>
-          <a:prstGeom prst="rect">
-            <a:avLst/>
-          </a:prstGeom>
-        </p:spPr>
-      </p:pic>
-      <p:pic>
-        <p:nvPicPr>
-          <p:cNvPr id="34" name="Picture 33">
-            <a:extLst>
-              <a:ext uri="{FF2B5EF4-FFF2-40B4-BE49-F238E27FC236}">
-                <a16:creationId xmlns:a16="http://schemas.microsoft.com/office/drawing/2014/main" id="{1C32610F-5445-4E12-87F6-F0591ABE7AD1}"/>
-              </a:ext>
-              <a:ext uri="{C183D7F6-B498-43B3-948B-1728B52AA6E4}">
-                <adec:decorative xmlns:adec="http://schemas.microsoft.com/office/drawing/2017/decorative" val="1"/>
-              </a:ext>
-            </a:extLst>
-          </p:cNvPr>
-          <p:cNvPicPr>
-            <a:picLocks noGrp="1" noRot="1" noChangeAspect="1" noMove="1" noResize="1" noEditPoints="1" noAdjustHandles="1" noChangeArrowheads="1" noChangeShapeType="1" noCrop="1"/>
-          </p:cNvPicPr>
-          <p:nvPr>
-            <p:extLst>
-              <p:ext uri="{386F3935-93C4-4BCD-93E2-E3B085C9AB24}">
-                <p16:designElem xmlns:p16="http://schemas.microsoft.com/office/powerpoint/2015/main" val="1"/>
-              </p:ext>
-            </p:extLst>
-          </p:nvPr>
-        </p:nvPicPr>
-        <p:blipFill rotWithShape="1">
-          <a:blip r:embed="rId4">
-            <a:duotone>
-              <a:schemeClr val="accent1">
-                <a:shade val="45000"/>
-                <a:satMod val="135000"/>
-              </a:schemeClr>
-              <a:prstClr val="white"/>
-            </a:duotone>
-            <a:extLst>
-              <a:ext uri="{28A0092B-C50C-407E-A947-70E740481C1C}">
-                <a14:useLocalDpi xmlns:a14="http://schemas.microsoft.com/office/drawing/2010/main" val="0"/>
-              </a:ext>
-            </a:extLst>
-          </a:blip>
-          <a:srcRect r="73964"/>
-          <a:stretch/>
-        </p:blipFill>
-        <p:spPr>
-          <a:xfrm>
-            <a:off x="11527047" y="3144779"/>
-            <a:ext cx="661905" cy="2548349"/>
-          </a:xfrm>
-          <a:prstGeom prst="rect">
-            <a:avLst/>
-          </a:prstGeom>
-        </p:spPr>
-      </p:pic>
-    </p:spTree>
-    <p:extLst>
-      <p:ext uri="{BB962C8B-B14F-4D97-AF65-F5344CB8AC3E}">
-        <p14:creationId xmlns:p14="http://schemas.microsoft.com/office/powerpoint/2010/main" val="865229869"/>
-      </p:ext>
-    </p:extLst>
-  </p:cSld>
-  <p:clrMapOvr>
-    <a:masterClrMapping/>
-  </p:clrMapOvr>
-</p:sld>
-</file>
-
-<file path=ppt/slides/slide8.xml><?xml version="1.0" encoding="utf-8"?>
-<p:sld xmlns:a="http://schemas.openxmlformats.org/drawingml/2006/main" xmlns:r="http://schemas.openxmlformats.org/officeDocument/2006/relationships" xmlns:p="http://schemas.openxmlformats.org/presentationml/2006/main">
-  <p:cSld>
-    <p:bg>
-      <p:bgPr>
-        <a:solidFill>
-          <a:schemeClr val="bg1"/>
-        </a:solidFill>
-        <a:effectLst/>
-      </p:bgPr>
-    </p:bg>
-    <p:spTree>
-      <p:nvGrpSpPr>
-        <p:cNvPr id="1" name=""/>
-        <p:cNvGrpSpPr/>
-        <p:nvPr/>
-      </p:nvGrpSpPr>
-      <p:grpSpPr>
-        <a:xfrm>
-          <a:off x="0" y="0"/>
-          <a:ext cx="0" cy="0"/>
-          <a:chOff x="0" y="0"/>
-          <a:chExt cx="0" cy="0"/>
-        </a:xfrm>
-      </p:grpSpPr>
-      <p:sp useBgFill="1">
-        <p:nvSpPr>
-          <p:cNvPr id="41" name="Rectangle 40">
-            <a:extLst>
-              <a:ext uri="{FF2B5EF4-FFF2-40B4-BE49-F238E27FC236}">
-                <a16:creationId xmlns:a16="http://schemas.microsoft.com/office/drawing/2014/main" id="{8651CFA9-6065-4243-AC48-858E359780B1}"/>
-              </a:ext>
-              <a:ext uri="{C183D7F6-B498-43B3-948B-1728B52AA6E4}">
-                <adec:decorative xmlns:adec="http://schemas.microsoft.com/office/drawing/2017/decorative" val="1"/>
-              </a:ext>
-            </a:extLst>
-          </p:cNvPr>
-          <p:cNvSpPr>
-            <a:spLocks noGrp="1" noRot="1" noChangeAspect="1" noMove="1" noResize="1" noEditPoints="1" noAdjustHandles="1" noChangeArrowheads="1" noChangeShapeType="1" noTextEdit="1"/>
-          </p:cNvSpPr>
-          <p:nvPr>
-            <p:extLst>
-              <p:ext uri="{386F3935-93C4-4BCD-93E2-E3B085C9AB24}">
-                <p16:designElem xmlns:p16="http://schemas.microsoft.com/office/powerpoint/2015/main" val="1"/>
-              </p:ext>
-            </p:extLst>
-          </p:nvPr>
-        </p:nvSpPr>
-        <p:spPr>
-          <a:xfrm>
-            <a:off x="0" y="0"/>
-            <a:ext cx="12188952" cy="6858000"/>
-          </a:xfrm>
-          <a:prstGeom prst="rect">
-            <a:avLst/>
-          </a:prstGeom>
-          <a:ln>
-            <a:noFill/>
-          </a:ln>
-        </p:spPr>
-        <p:style>
-          <a:lnRef idx="2">
-            <a:schemeClr val="accent1">
-              <a:shade val="50000"/>
-            </a:schemeClr>
-          </a:lnRef>
-          <a:fillRef idx="1">
-            <a:schemeClr val="accent1"/>
-          </a:fillRef>
-          <a:effectRef idx="0">
-            <a:schemeClr val="accent1"/>
-          </a:effectRef>
-          <a:fontRef idx="minor">
-            <a:schemeClr val="lt1"/>
-          </a:fontRef>
-        </p:style>
-        <p:txBody>
-          <a:bodyPr rtlCol="0" anchor="ctr"/>
-          <a:lstStyle/>
-          <a:p>
-            <a:pPr algn="ctr"/>
-            <a:endParaRPr lang="en-US">
-              <a:solidFill>
-                <a:schemeClr val="tx1">
-                  <a:lumMod val="65000"/>
-                  <a:lumOff val="35000"/>
-                </a:schemeClr>
-              </a:solidFill>
-              <a:latin typeface="AvenirNext LT Pro Medium" panose="020B0504020202020204" pitchFamily="34" charset="0"/>
-            </a:endParaRPr>
-          </a:p>
-        </p:txBody>
-      </p:sp>
-      <p:sp>
-        <p:nvSpPr>
-          <p:cNvPr id="43" name="Rectangle 42">
-            <a:extLst>
-              <a:ext uri="{FF2B5EF4-FFF2-40B4-BE49-F238E27FC236}">
-                <a16:creationId xmlns:a16="http://schemas.microsoft.com/office/drawing/2014/main" id="{37962AE0-6A1C-4B76-9D52-10E5E6D7D3BB}"/>
-              </a:ext>
-              <a:ext uri="{C183D7F6-B498-43B3-948B-1728B52AA6E4}">
-                <adec:decorative xmlns:adec="http://schemas.microsoft.com/office/drawing/2017/decorative" val="1"/>
-              </a:ext>
-            </a:extLst>
-          </p:cNvPr>
-          <p:cNvSpPr>
-            <a:spLocks noGrp="1" noRot="1" noChangeAspect="1" noMove="1" noResize="1" noEditPoints="1" noAdjustHandles="1" noChangeArrowheads="1" noChangeShapeType="1" noTextEdit="1"/>
-          </p:cNvSpPr>
-          <p:nvPr>
-            <p:extLst>
-              <p:ext uri="{386F3935-93C4-4BCD-93E2-E3B085C9AB24}">
-                <p16:designElem xmlns:p16="http://schemas.microsoft.com/office/powerpoint/2015/main" val="1"/>
-              </p:ext>
-            </p:extLst>
-          </p:nvPr>
-        </p:nvSpPr>
-        <p:spPr>
-          <a:xfrm>
-            <a:off x="0" y="0"/>
-            <a:ext cx="12188952" cy="6858000"/>
-          </a:xfrm>
-          <a:prstGeom prst="rect">
-            <a:avLst/>
-          </a:prstGeom>
-          <a:solidFill>
-            <a:schemeClr val="bg2">
-              <a:alpha val="70000"/>
-            </a:schemeClr>
-          </a:solidFill>
-          <a:ln>
-            <a:noFill/>
-          </a:ln>
-        </p:spPr>
-        <p:style>
-          <a:lnRef idx="2">
-            <a:schemeClr val="accent1">
-              <a:shade val="50000"/>
-            </a:schemeClr>
-          </a:lnRef>
-          <a:fillRef idx="1">
-            <a:schemeClr val="accent1"/>
-          </a:fillRef>
-          <a:effectRef idx="0">
-            <a:schemeClr val="accent1"/>
-          </a:effectRef>
-          <a:fontRef idx="minor">
-            <a:schemeClr val="lt1"/>
-          </a:fontRef>
-        </p:style>
-        <p:txBody>
-          <a:bodyPr rtlCol="0" anchor="ctr"/>
-          <a:lstStyle/>
-          <a:p>
-            <a:pPr algn="ctr"/>
-            <a:endParaRPr lang="en-US">
-              <a:solidFill>
-                <a:schemeClr val="tx1">
-                  <a:lumMod val="65000"/>
-                  <a:lumOff val="35000"/>
-                </a:schemeClr>
-              </a:solidFill>
-              <a:latin typeface="AvenirNext LT Pro Medium" panose="020B0504020202020204" pitchFamily="34" charset="0"/>
-            </a:endParaRPr>
-          </a:p>
-        </p:txBody>
-      </p:sp>
-      <p:sp>
-        <p:nvSpPr>
-          <p:cNvPr id="45" name="Rectangle 44">
-            <a:extLst>
-              <a:ext uri="{FF2B5EF4-FFF2-40B4-BE49-F238E27FC236}">
-                <a16:creationId xmlns:a16="http://schemas.microsoft.com/office/drawing/2014/main" id="{027CAEDE-D92D-4745-8749-71019415A797}"/>
-              </a:ext>
-              <a:ext uri="{C183D7F6-B498-43B3-948B-1728B52AA6E4}">
-                <adec:decorative xmlns:adec="http://schemas.microsoft.com/office/drawing/2017/decorative" val="1"/>
-              </a:ext>
-            </a:extLst>
-          </p:cNvPr>
-          <p:cNvSpPr>
-            <a:spLocks noGrp="1" noRot="1" noChangeAspect="1" noMove="1" noResize="1" noEditPoints="1" noAdjustHandles="1" noChangeArrowheads="1" noChangeShapeType="1" noTextEdit="1"/>
-          </p:cNvSpPr>
-          <p:nvPr>
-            <p:extLst>
-              <p:ext uri="{386F3935-93C4-4BCD-93E2-E3B085C9AB24}">
-                <p16:designElem xmlns:p16="http://schemas.microsoft.com/office/powerpoint/2015/main" val="1"/>
-              </p:ext>
-            </p:extLst>
-          </p:nvPr>
-        </p:nvSpPr>
-        <p:spPr>
-          <a:xfrm>
-            <a:off x="0" y="0"/>
-            <a:ext cx="6096000" cy="6858000"/>
-          </a:xfrm>
-          <a:prstGeom prst="rect">
-            <a:avLst/>
-          </a:prstGeom>
-          <a:solidFill>
-            <a:schemeClr val="tx2">
-              <a:lumMod val="90000"/>
-              <a:lumOff val="10000"/>
-            </a:schemeClr>
-          </a:solidFill>
-          <a:ln>
-            <a:noFill/>
-          </a:ln>
-        </p:spPr>
-        <p:style>
-          <a:lnRef idx="2">
-            <a:schemeClr val="accent1">
-              <a:shade val="50000"/>
-            </a:schemeClr>
-          </a:lnRef>
-          <a:fillRef idx="1">
-            <a:schemeClr val="accent1"/>
-          </a:fillRef>
-          <a:effectRef idx="0">
-            <a:schemeClr val="accent1"/>
-          </a:effectRef>
-          <a:fontRef idx="minor">
-            <a:schemeClr val="lt1"/>
-          </a:fontRef>
-        </p:style>
-        <p:txBody>
-          <a:bodyPr rtlCol="0" anchor="ctr"/>
-          <a:lstStyle/>
-          <a:p>
-            <a:pPr algn="ctr"/>
-            <a:endParaRPr lang="en-US" dirty="0"/>
-          </a:p>
-        </p:txBody>
-      </p:sp>
-      <p:sp>
-        <p:nvSpPr>
-          <p:cNvPr id="47" name="Rectangle 46">
-            <a:extLst>
-              <a:ext uri="{FF2B5EF4-FFF2-40B4-BE49-F238E27FC236}">
-                <a16:creationId xmlns:a16="http://schemas.microsoft.com/office/drawing/2014/main" id="{00C96CB6-3880-40E6-A4BF-F64E7D1E4295}"/>
-              </a:ext>
-              <a:ext uri="{C183D7F6-B498-43B3-948B-1728B52AA6E4}">
-                <adec:decorative xmlns:adec="http://schemas.microsoft.com/office/drawing/2017/decorative" val="1"/>
-              </a:ext>
-            </a:extLst>
-          </p:cNvPr>
-          <p:cNvSpPr>
-            <a:spLocks noGrp="1" noRot="1" noChangeAspect="1" noMove="1" noResize="1" noEditPoints="1" noAdjustHandles="1" noChangeArrowheads="1" noChangeShapeType="1" noTextEdit="1"/>
-          </p:cNvSpPr>
-          <p:nvPr>
-            <p:extLst>
-              <p:ext uri="{386F3935-93C4-4BCD-93E2-E3B085C9AB24}">
-                <p16:designElem xmlns:p16="http://schemas.microsoft.com/office/powerpoint/2015/main" val="1"/>
-              </p:ext>
-            </p:extLst>
-          </p:nvPr>
-        </p:nvSpPr>
-        <p:spPr>
-          <a:xfrm>
-            <a:off x="0" y="0"/>
-            <a:ext cx="6096000" cy="6858000"/>
-          </a:xfrm>
-          <a:prstGeom prst="rect">
-            <a:avLst/>
-          </a:prstGeom>
-          <a:blipFill dpi="0" rotWithShape="1">
-            <a:blip r:embed="rId2">
-              <a:alphaModFix amt="24000"/>
-              <a:duotone>
-                <a:schemeClr val="accent1">
-                  <a:shade val="45000"/>
-                  <a:satMod val="135000"/>
-                </a:schemeClr>
-                <a:prstClr val="white"/>
-              </a:duotone>
-            </a:blip>
-            <a:srcRect/>
-            <a:tile tx="889000" ty="0" sx="100000" sy="100000" flip="none" algn="tl"/>
-          </a:blipFill>
-          <a:ln>
-            <a:noFill/>
-          </a:ln>
-        </p:spPr>
-        <p:style>
-          <a:lnRef idx="2">
-            <a:schemeClr val="accent1">
-              <a:shade val="50000"/>
-            </a:schemeClr>
-          </a:lnRef>
-          <a:fillRef idx="1">
-            <a:schemeClr val="accent1"/>
-          </a:fillRef>
-          <a:effectRef idx="0">
-            <a:schemeClr val="accent1"/>
-          </a:effectRef>
-          <a:fontRef idx="minor">
-            <a:schemeClr val="lt1"/>
-          </a:fontRef>
-        </p:style>
-        <p:txBody>
-          <a:bodyPr rtlCol="0" anchor="ctr"/>
-          <a:lstStyle/>
-          <a:p>
-            <a:pPr algn="ctr"/>
-            <a:endParaRPr lang="en-US" dirty="0"/>
-          </a:p>
-        </p:txBody>
-      </p:sp>
-      <p:sp>
-        <p:nvSpPr>
-          <p:cNvPr id="2" name="Заголовок 1">
-            <a:extLst>
-              <a:ext uri="{FF2B5EF4-FFF2-40B4-BE49-F238E27FC236}">
-                <a16:creationId xmlns:a16="http://schemas.microsoft.com/office/drawing/2014/main" id="{254C042B-106C-0788-06CA-FBB56A76EAB3}"/>
-              </a:ext>
-            </a:extLst>
-          </p:cNvPr>
-          <p:cNvSpPr>
-            <a:spLocks noGrp="1"/>
-          </p:cNvSpPr>
-          <p:nvPr>
-            <p:ph type="title"/>
-          </p:nvPr>
-        </p:nvSpPr>
-        <p:spPr>
-          <a:xfrm>
-            <a:off x="838201" y="559813"/>
-            <a:ext cx="4876800" cy="5577934"/>
-          </a:xfrm>
-        </p:spPr>
-        <p:txBody>
-          <a:bodyPr>
-            <a:normAutofit/>
-          </a:bodyPr>
-          <a:lstStyle/>
-          <a:p>
-            <a:r>
-              <a:rPr lang="ru-RU" dirty="0"/>
-              <a:t>Функциональные требования</a:t>
-            </a:r>
-          </a:p>
-        </p:txBody>
-      </p:sp>
-      <p:sp>
-        <p:nvSpPr>
-          <p:cNvPr id="82" name="Объект 2">
-            <a:extLst>
-              <a:ext uri="{FF2B5EF4-FFF2-40B4-BE49-F238E27FC236}">
-                <a16:creationId xmlns:a16="http://schemas.microsoft.com/office/drawing/2014/main" id="{9DE9DC6C-7C7C-E371-0A51-2782A07F7B1A}"/>
-              </a:ext>
-            </a:extLst>
-          </p:cNvPr>
-          <p:cNvSpPr>
-            <a:spLocks noGrp="1"/>
-          </p:cNvSpPr>
-          <p:nvPr>
-            <p:ph idx="1"/>
-          </p:nvPr>
-        </p:nvSpPr>
-        <p:spPr>
-          <a:xfrm>
-            <a:off x="6705600" y="559813"/>
-            <a:ext cx="4467677" cy="5553275"/>
-          </a:xfrm>
-        </p:spPr>
-        <p:txBody>
-          <a:bodyPr>
-            <a:normAutofit/>
-          </a:bodyPr>
-          <a:lstStyle/>
-          <a:p>
-            <a:pPr>
-              <a:lnSpc>
-                <a:spcPct val="100000"/>
-              </a:lnSpc>
-            </a:pPr>
-            <a:r>
-              <a:rPr lang="ru-RU" sz="1500" dirty="0">
-                <a:solidFill>
-                  <a:schemeClr val="tx2"/>
-                </a:solidFill>
-              </a:rPr>
-              <a:t>Пользователи должны иметь возможность регистрироваться и входить в систему.</a:t>
-            </a:r>
-          </a:p>
-          <a:p>
-            <a:pPr>
-              <a:lnSpc>
-                <a:spcPct val="100000"/>
-              </a:lnSpc>
-            </a:pPr>
-            <a:r>
-              <a:rPr lang="ru-RU" sz="1500" dirty="0">
-                <a:solidFill>
-                  <a:schemeClr val="tx2"/>
-                </a:solidFill>
-              </a:rPr>
-              <a:t>Администраторы должны иметь возможность создавать, редактировать и удалять события.</a:t>
-            </a:r>
-          </a:p>
-          <a:p>
-            <a:pPr>
-              <a:lnSpc>
-                <a:spcPct val="100000"/>
-              </a:lnSpc>
-            </a:pPr>
-            <a:r>
-              <a:rPr lang="ru-RU" sz="1500" dirty="0">
-                <a:solidFill>
-                  <a:schemeClr val="tx2"/>
-                </a:solidFill>
-              </a:rPr>
-              <a:t>Пользователи должны иметь возможность делать ставки на доступные события.</a:t>
-            </a:r>
-          </a:p>
-          <a:p>
-            <a:pPr>
-              <a:lnSpc>
-                <a:spcPct val="100000"/>
-              </a:lnSpc>
-            </a:pPr>
-            <a:r>
-              <a:rPr lang="ru-RU" sz="1500" dirty="0">
-                <a:solidFill>
-                  <a:schemeClr val="tx2"/>
-                </a:solidFill>
-              </a:rPr>
-              <a:t>Пользователи должны иметь доступ к истории своих ставок и результатам.</a:t>
-            </a:r>
-          </a:p>
-          <a:p>
-            <a:pPr>
-              <a:lnSpc>
-                <a:spcPct val="100000"/>
-              </a:lnSpc>
-            </a:pPr>
-            <a:r>
-              <a:rPr lang="ru-RU" sz="1500" dirty="0">
-                <a:solidFill>
-                  <a:schemeClr val="tx2"/>
-                </a:solidFill>
-              </a:rPr>
-              <a:t>Внутренняя валюта (УЕ):</a:t>
-            </a:r>
-          </a:p>
-          <a:p>
-            <a:pPr lvl="1">
-              <a:lnSpc>
-                <a:spcPct val="100000"/>
-              </a:lnSpc>
-            </a:pPr>
-            <a:r>
-              <a:rPr lang="ru-RU" sz="1500" dirty="0">
-                <a:solidFill>
-                  <a:schemeClr val="tx2"/>
-                </a:solidFill>
-              </a:rPr>
-              <a:t>Система должна использовать внутреннюю валюту, условную единицу - "УЕ".</a:t>
-            </a:r>
-          </a:p>
-          <a:p>
-            <a:pPr lvl="1">
-              <a:lnSpc>
-                <a:spcPct val="100000"/>
-              </a:lnSpc>
-            </a:pPr>
-            <a:r>
-              <a:rPr lang="ru-RU" sz="1500" dirty="0">
-                <a:solidFill>
-                  <a:schemeClr val="tx2"/>
-                </a:solidFill>
-              </a:rPr>
-              <a:t>Должна быть возможность обновлять счета пользователей, когда они приобретают УЕ.</a:t>
-            </a:r>
-          </a:p>
-          <a:p>
-            <a:pPr lvl="1">
-              <a:lnSpc>
-                <a:spcPct val="100000"/>
-              </a:lnSpc>
-            </a:pPr>
-            <a:r>
-              <a:rPr lang="ru-RU" sz="1500" dirty="0">
-                <a:solidFill>
-                  <a:schemeClr val="tx2"/>
-                </a:solidFill>
-              </a:rPr>
-              <a:t>У пользователей должна быть возможность заказать конвертацию и вывод УЕ во вне.</a:t>
-            </a:r>
-          </a:p>
-        </p:txBody>
-      </p:sp>
-    </p:spTree>
-    <p:extLst>
-      <p:ext uri="{BB962C8B-B14F-4D97-AF65-F5344CB8AC3E}">
-        <p14:creationId xmlns:p14="http://schemas.microsoft.com/office/powerpoint/2010/main" val="434379438"/>
-      </p:ext>
-    </p:extLst>
-  </p:cSld>
-  <p:clrMapOvr>
-    <a:masterClrMapping/>
-  </p:clrMapOvr>
-</p:sld>
-</file>
-
-<file path=ppt/slides/slide9.xml><?xml version="1.0" encoding="utf-8"?>
-<p:sld xmlns:a="http://schemas.openxmlformats.org/drawingml/2006/main" xmlns:r="http://schemas.openxmlformats.org/officeDocument/2006/relationships" xmlns:p="http://schemas.openxmlformats.org/presentationml/2006/main">
-  <p:cSld>
-    <p:bg>
-      <p:bgPr>
-        <a:solidFill>
-          <a:schemeClr val="bg1"/>
-        </a:solidFill>
-        <a:effectLst/>
-      </p:bgPr>
-    </p:bg>
-    <p:spTree>
-      <p:nvGrpSpPr>
-        <p:cNvPr id="1" name=""/>
-        <p:cNvGrpSpPr/>
-        <p:nvPr/>
-      </p:nvGrpSpPr>
-      <p:grpSpPr>
-        <a:xfrm>
-          <a:off x="0" y="0"/>
-          <a:ext cx="0" cy="0"/>
-          <a:chOff x="0" y="0"/>
-          <a:chExt cx="0" cy="0"/>
-        </a:xfrm>
-      </p:grpSpPr>
-      <p:sp>
-        <p:nvSpPr>
-          <p:cNvPr id="13" name="Rectangle 12">
-            <a:extLst>
-              <a:ext uri="{FF2B5EF4-FFF2-40B4-BE49-F238E27FC236}">
-                <a16:creationId xmlns:a16="http://schemas.microsoft.com/office/drawing/2014/main" id="{0BABF38A-8A0D-492E-BD20-6CF4D46B50BD}"/>
-              </a:ext>
-              <a:ext uri="{C183D7F6-B498-43B3-948B-1728B52AA6E4}">
-                <adec:decorative xmlns:adec="http://schemas.microsoft.com/office/drawing/2017/decorative" val="1"/>
-              </a:ext>
-            </a:extLst>
-          </p:cNvPr>
-          <p:cNvSpPr>
-            <a:spLocks noGrp="1" noRot="1" noChangeAspect="1" noMove="1" noResize="1" noEditPoints="1" noAdjustHandles="1" noChangeArrowheads="1" noChangeShapeType="1" noTextEdit="1"/>
-          </p:cNvSpPr>
-          <p:nvPr>
-            <p:extLst>
-              <p:ext uri="{386F3935-93C4-4BCD-93E2-E3B085C9AB24}">
-                <p16:designElem xmlns:p16="http://schemas.microsoft.com/office/powerpoint/2015/main" val="1"/>
-              </p:ext>
-            </p:extLst>
-          </p:nvPr>
-        </p:nvSpPr>
-        <p:spPr>
-          <a:xfrm>
-            <a:off x="0" y="1"/>
-            <a:ext cx="12192000" cy="6858004"/>
-          </a:xfrm>
-          <a:prstGeom prst="rect">
-            <a:avLst/>
-          </a:prstGeom>
-          <a:solidFill>
-            <a:schemeClr val="tx2">
-              <a:lumMod val="90000"/>
-              <a:lumOff val="10000"/>
-            </a:schemeClr>
-          </a:solidFill>
-          <a:ln>
-            <a:noFill/>
-          </a:ln>
-        </p:spPr>
-        <p:style>
-          <a:lnRef idx="2">
-            <a:schemeClr val="accent1">
-              <a:shade val="50000"/>
-            </a:schemeClr>
-          </a:lnRef>
-          <a:fillRef idx="1">
-            <a:schemeClr val="accent1"/>
-          </a:fillRef>
-          <a:effectRef idx="0">
-            <a:schemeClr val="accent1"/>
-          </a:effectRef>
-          <a:fontRef idx="minor">
-            <a:schemeClr val="lt1"/>
-          </a:fontRef>
-        </p:style>
-        <p:txBody>
-          <a:bodyPr rtlCol="0" anchor="ctr"/>
-          <a:lstStyle/>
-          <a:p>
-            <a:pPr algn="ctr"/>
-            <a:endParaRPr lang="en-US" dirty="0">
-              <a:solidFill>
-                <a:schemeClr val="tx1">
-                  <a:lumMod val="65000"/>
-                  <a:lumOff val="35000"/>
-                </a:schemeClr>
-              </a:solidFill>
-              <a:latin typeface="AvenirNext LT Pro Medium" panose="020B0504020202020204" pitchFamily="34" charset="0"/>
-            </a:endParaRPr>
-          </a:p>
-        </p:txBody>
-      </p:sp>
-      <p:pic>
-        <p:nvPicPr>
-          <p:cNvPr id="15" name="Picture 14">
-            <a:extLst>
-              <a:ext uri="{FF2B5EF4-FFF2-40B4-BE49-F238E27FC236}">
-                <a16:creationId xmlns:a16="http://schemas.microsoft.com/office/drawing/2014/main" id="{1CB7E8AE-A3AC-4BB7-A5C6-F00EC697B265}"/>
-              </a:ext>
-              <a:ext uri="{C183D7F6-B498-43B3-948B-1728B52AA6E4}">
-                <adec:decorative xmlns:adec="http://schemas.microsoft.com/office/drawing/2017/decorative" val="1"/>
-              </a:ext>
-            </a:extLst>
-          </p:cNvPr>
-          <p:cNvPicPr>
-            <a:picLocks noGrp="1" noRot="1" noChangeAspect="1" noMove="1" noResize="1" noEditPoints="1" noAdjustHandles="1" noChangeArrowheads="1" noChangeShapeType="1" noCrop="1"/>
-          </p:cNvPicPr>
-          <p:nvPr>
-            <p:extLst>
-              <p:ext uri="{386F3935-93C4-4BCD-93E2-E3B085C9AB24}">
-                <p16:designElem xmlns:p16="http://schemas.microsoft.com/office/powerpoint/2015/main" val="1"/>
-              </p:ext>
-            </p:extLst>
-          </p:nvPr>
-        </p:nvPicPr>
-        <p:blipFill>
-          <a:blip r:embed="rId2">
-            <a:alphaModFix amt="35000"/>
-            <a:extLst>
-              <a:ext uri="{28A0092B-C50C-407E-A947-70E740481C1C}">
-                <a14:useLocalDpi xmlns:a14="http://schemas.microsoft.com/office/drawing/2010/main" val="0"/>
-              </a:ext>
-            </a:extLst>
-          </a:blip>
-          <a:stretch>
-            <a:fillRect/>
-          </a:stretch>
-        </p:blipFill>
-        <p:spPr>
-          <a:xfrm>
-            <a:off x="0" y="1"/>
-            <a:ext cx="12192000" cy="1392401"/>
-          </a:xfrm>
-          <a:prstGeom prst="rect">
-            <a:avLst/>
-          </a:prstGeom>
-        </p:spPr>
-      </p:pic>
-      <p:sp useBgFill="1">
-        <p:nvSpPr>
-          <p:cNvPr id="17" name="Rectangle 16">
-            <a:extLst>
-              <a:ext uri="{FF2B5EF4-FFF2-40B4-BE49-F238E27FC236}">
-                <a16:creationId xmlns:a16="http://schemas.microsoft.com/office/drawing/2014/main" id="{F1174801-1395-44C5-9B00-CCAC45C056E7}"/>
-              </a:ext>
-              <a:ext uri="{C183D7F6-B498-43B3-948B-1728B52AA6E4}">
-                <adec:decorative xmlns:adec="http://schemas.microsoft.com/office/drawing/2017/decorative" val="1"/>
-              </a:ext>
-            </a:extLst>
-          </p:cNvPr>
-          <p:cNvSpPr>
-            <a:spLocks noGrp="1" noRot="1" noChangeAspect="1" noMove="1" noResize="1" noEditPoints="1" noAdjustHandles="1" noChangeArrowheads="1" noChangeShapeType="1" noTextEdit="1"/>
-          </p:cNvSpPr>
-          <p:nvPr>
-            <p:extLst>
-              <p:ext uri="{386F3935-93C4-4BCD-93E2-E3B085C9AB24}">
-                <p16:designElem xmlns:p16="http://schemas.microsoft.com/office/powerpoint/2015/main" val="1"/>
-              </p:ext>
-            </p:extLst>
-          </p:nvPr>
-        </p:nvSpPr>
-        <p:spPr>
-          <a:xfrm>
-            <a:off x="0" y="0"/>
-            <a:ext cx="12188952" cy="6858000"/>
-          </a:xfrm>
-          <a:prstGeom prst="rect">
-            <a:avLst/>
-          </a:prstGeom>
-          <a:ln>
-            <a:noFill/>
-          </a:ln>
-        </p:spPr>
-        <p:style>
-          <a:lnRef idx="2">
-            <a:schemeClr val="accent1">
-              <a:shade val="50000"/>
-            </a:schemeClr>
-          </a:lnRef>
-          <a:fillRef idx="1">
-            <a:schemeClr val="accent1"/>
-          </a:fillRef>
-          <a:effectRef idx="0">
-            <a:schemeClr val="accent1"/>
-          </a:effectRef>
-          <a:fontRef idx="minor">
-            <a:schemeClr val="lt1"/>
-          </a:fontRef>
-        </p:style>
-        <p:txBody>
-          <a:bodyPr rtlCol="0" anchor="ctr"/>
-          <a:lstStyle/>
-          <a:p>
-            <a:pPr algn="ctr"/>
-            <a:endParaRPr lang="en-US" dirty="0">
-              <a:solidFill>
-                <a:schemeClr val="tx1">
-                  <a:lumMod val="65000"/>
-                  <a:lumOff val="35000"/>
-                </a:schemeClr>
-              </a:solidFill>
-              <a:latin typeface="AvenirNext LT Pro Medium" panose="020B0504020202020204" pitchFamily="34" charset="0"/>
-            </a:endParaRPr>
-          </a:p>
-        </p:txBody>
-      </p:sp>
-      <p:sp>
-        <p:nvSpPr>
-          <p:cNvPr id="19" name="Rectangle 18">
-            <a:extLst>
-              <a:ext uri="{FF2B5EF4-FFF2-40B4-BE49-F238E27FC236}">
-                <a16:creationId xmlns:a16="http://schemas.microsoft.com/office/drawing/2014/main" id="{8DBEE602-02D2-420A-AFC1-438A1699A5E5}"/>
-              </a:ext>
-              <a:ext uri="{C183D7F6-B498-43B3-948B-1728B52AA6E4}">
-                <adec:decorative xmlns:adec="http://schemas.microsoft.com/office/drawing/2017/decorative" val="1"/>
-              </a:ext>
-            </a:extLst>
-          </p:cNvPr>
-          <p:cNvSpPr>
-            <a:spLocks noGrp="1" noRot="1" noChangeAspect="1" noMove="1" noResize="1" noEditPoints="1" noAdjustHandles="1" noChangeArrowheads="1" noChangeShapeType="1" noTextEdit="1"/>
-          </p:cNvSpPr>
-          <p:nvPr>
-            <p:extLst>
-              <p:ext uri="{386F3935-93C4-4BCD-93E2-E3B085C9AB24}">
-                <p16:designElem xmlns:p16="http://schemas.microsoft.com/office/powerpoint/2015/main" val="1"/>
-              </p:ext>
-            </p:extLst>
-          </p:nvPr>
-        </p:nvSpPr>
-        <p:spPr>
-          <a:xfrm>
-            <a:off x="0" y="0"/>
-            <a:ext cx="12188952" cy="6858000"/>
-          </a:xfrm>
-          <a:prstGeom prst="rect">
-            <a:avLst/>
-          </a:prstGeom>
-          <a:solidFill>
-            <a:schemeClr val="bg2">
-              <a:alpha val="61000"/>
-            </a:schemeClr>
-          </a:solidFill>
-          <a:ln>
-            <a:solidFill>
-              <a:schemeClr val="bg1">
-                <a:lumMod val="95000"/>
-              </a:schemeClr>
-            </a:solidFill>
-          </a:ln>
-        </p:spPr>
-        <p:style>
-          <a:lnRef idx="2">
-            <a:schemeClr val="accent1">
-              <a:shade val="50000"/>
-            </a:schemeClr>
-          </a:lnRef>
-          <a:fillRef idx="1">
-            <a:schemeClr val="accent1"/>
-          </a:fillRef>
-          <a:effectRef idx="0">
-            <a:schemeClr val="accent1"/>
-          </a:effectRef>
-          <a:fontRef idx="minor">
-            <a:schemeClr val="lt1"/>
-          </a:fontRef>
-        </p:style>
-        <p:txBody>
-          <a:bodyPr rtlCol="0" anchor="ctr"/>
-          <a:lstStyle/>
-          <a:p>
-            <a:pPr algn="ctr"/>
-            <a:endParaRPr lang="en-US" dirty="0">
-              <a:solidFill>
-                <a:schemeClr val="tx1">
-                  <a:lumMod val="65000"/>
-                  <a:lumOff val="35000"/>
-                </a:schemeClr>
-              </a:solidFill>
-              <a:latin typeface="AvenirNext LT Pro Medium" panose="020B0504020202020204" pitchFamily="34" charset="0"/>
-            </a:endParaRPr>
-          </a:p>
-        </p:txBody>
-      </p:sp>
-      <p:sp>
-        <p:nvSpPr>
-          <p:cNvPr id="2" name="Заголовок 1">
-            <a:extLst>
-              <a:ext uri="{FF2B5EF4-FFF2-40B4-BE49-F238E27FC236}">
-                <a16:creationId xmlns:a16="http://schemas.microsoft.com/office/drawing/2014/main" id="{3AB91A21-DB58-A68D-FD9A-C7B36A43FCA5}"/>
-              </a:ext>
-            </a:extLst>
-          </p:cNvPr>
-          <p:cNvSpPr>
-            <a:spLocks noGrp="1"/>
-          </p:cNvSpPr>
-          <p:nvPr>
-            <p:ph type="title"/>
-          </p:nvPr>
-        </p:nvSpPr>
-        <p:spPr>
-          <a:xfrm>
-            <a:off x="242669" y="2315998"/>
-            <a:ext cx="3262987" cy="1392401"/>
-          </a:xfrm>
-        </p:spPr>
-        <p:txBody>
-          <a:bodyPr vert="horz" lIns="91440" tIns="45720" rIns="91440" bIns="45720" rtlCol="0" anchor="b">
-            <a:normAutofit fontScale="90000"/>
-          </a:bodyPr>
-          <a:lstStyle/>
-          <a:p>
-            <a:r>
-              <a:rPr lang="en-US" dirty="0" err="1">
-                <a:solidFill>
-                  <a:schemeClr val="tx2"/>
-                </a:solidFill>
-              </a:rPr>
-              <a:t>База</a:t>
-            </a:r>
-            <a:r>
-              <a:rPr lang="en-US" dirty="0">
-                <a:solidFill>
-                  <a:schemeClr val="tx2"/>
-                </a:solidFill>
-              </a:rPr>
-              <a:t> </a:t>
-            </a:r>
-            <a:r>
-              <a:rPr lang="en-US" dirty="0" err="1">
-                <a:solidFill>
-                  <a:schemeClr val="tx2"/>
-                </a:solidFill>
-              </a:rPr>
-              <a:t>данных</a:t>
-            </a:r>
-            <a:endParaRPr lang="en-US" dirty="0">
-              <a:solidFill>
-                <a:schemeClr val="tx2"/>
-              </a:solidFill>
-            </a:endParaRPr>
-          </a:p>
-        </p:txBody>
-      </p:sp>
-      <p:sp>
-        <p:nvSpPr>
-          <p:cNvPr id="21" name="Rectangle 20">
-            <a:extLst>
-              <a:ext uri="{FF2B5EF4-FFF2-40B4-BE49-F238E27FC236}">
-                <a16:creationId xmlns:a16="http://schemas.microsoft.com/office/drawing/2014/main" id="{B3FAB79E-1E1B-4287-B4EA-26E497404C89}"/>
-              </a:ext>
-              <a:ext uri="{C183D7F6-B498-43B3-948B-1728B52AA6E4}">
-                <adec:decorative xmlns:adec="http://schemas.microsoft.com/office/drawing/2017/decorative" val="1"/>
-              </a:ext>
-            </a:extLst>
-          </p:cNvPr>
-          <p:cNvSpPr>
-            <a:spLocks noGrp="1" noRot="1" noChangeAspect="1" noMove="1" noResize="1" noEditPoints="1" noAdjustHandles="1" noChangeArrowheads="1" noChangeShapeType="1" noTextEdit="1"/>
-          </p:cNvSpPr>
-          <p:nvPr>
-            <p:extLst>
-              <p:ext uri="{386F3935-93C4-4BCD-93E2-E3B085C9AB24}">
-                <p16:designElem xmlns:p16="http://schemas.microsoft.com/office/powerpoint/2015/main" val="1"/>
-              </p:ext>
-            </p:extLst>
-          </p:nvPr>
-        </p:nvSpPr>
-        <p:spPr>
-          <a:xfrm>
-            <a:off x="0" y="5730812"/>
-            <a:ext cx="12192000" cy="1127188"/>
-          </a:xfrm>
-          <a:prstGeom prst="rect">
-            <a:avLst/>
-          </a:prstGeom>
-          <a:solidFill>
-            <a:schemeClr val="tx2">
-              <a:lumMod val="90000"/>
-              <a:lumOff val="10000"/>
-            </a:schemeClr>
-          </a:solidFill>
-          <a:ln>
-            <a:noFill/>
-          </a:ln>
-        </p:spPr>
-        <p:style>
-          <a:lnRef idx="2">
-            <a:schemeClr val="accent1">
-              <a:shade val="50000"/>
-            </a:schemeClr>
-          </a:lnRef>
-          <a:fillRef idx="1">
-            <a:schemeClr val="accent1"/>
-          </a:fillRef>
-          <a:effectRef idx="0">
-            <a:schemeClr val="accent1"/>
-          </a:effectRef>
-          <a:fontRef idx="minor">
-            <a:schemeClr val="lt1"/>
-          </a:fontRef>
-        </p:style>
-        <p:txBody>
-          <a:bodyPr rtlCol="0" anchor="ctr"/>
-          <a:lstStyle/>
-          <a:p>
-            <a:pPr algn="ctr"/>
-            <a:endParaRPr lang="en-US" dirty="0">
-              <a:solidFill>
-                <a:schemeClr val="tx1">
-                  <a:lumMod val="65000"/>
-                  <a:lumOff val="35000"/>
-                </a:schemeClr>
-              </a:solidFill>
-              <a:latin typeface="AvenirNext LT Pro Medium" panose="020B0504020202020204" pitchFamily="34" charset="0"/>
-            </a:endParaRPr>
-          </a:p>
-        </p:txBody>
-      </p:sp>
-      <p:sp>
-        <p:nvSpPr>
-          <p:cNvPr id="23" name="Rectangle 22">
-            <a:extLst>
-              <a:ext uri="{FF2B5EF4-FFF2-40B4-BE49-F238E27FC236}">
-                <a16:creationId xmlns:a16="http://schemas.microsoft.com/office/drawing/2014/main" id="{A22256D1-A993-4D2E-943C-2E87F8BFC629}"/>
-              </a:ext>
-              <a:ext uri="{C183D7F6-B498-43B3-948B-1728B52AA6E4}">
-                <adec:decorative xmlns:adec="http://schemas.microsoft.com/office/drawing/2017/decorative" val="1"/>
-              </a:ext>
-            </a:extLst>
-          </p:cNvPr>
-          <p:cNvSpPr>
-            <a:spLocks noGrp="1" noRot="1" noChangeAspect="1" noMove="1" noResize="1" noEditPoints="1" noAdjustHandles="1" noChangeArrowheads="1" noChangeShapeType="1" noTextEdit="1"/>
-          </p:cNvSpPr>
-          <p:nvPr>
-            <p:extLst>
-              <p:ext uri="{386F3935-93C4-4BCD-93E2-E3B085C9AB24}">
-                <p16:designElem xmlns:p16="http://schemas.microsoft.com/office/powerpoint/2015/main" val="1"/>
-              </p:ext>
-            </p:extLst>
-          </p:nvPr>
-        </p:nvSpPr>
-        <p:spPr>
-          <a:xfrm rot="10800000">
-            <a:off x="-3060" y="5730813"/>
-            <a:ext cx="12191999" cy="1127186"/>
-          </a:xfrm>
-          <a:prstGeom prst="rect">
-            <a:avLst/>
-          </a:prstGeom>
-          <a:blipFill dpi="0" rotWithShape="1">
-            <a:blip r:embed="rId3">
-              <a:alphaModFix amt="20000"/>
-              <a:duotone>
-                <a:schemeClr val="accent1">
-                  <a:shade val="45000"/>
-                  <a:satMod val="135000"/>
-                </a:schemeClr>
-                <a:prstClr val="white"/>
-              </a:duotone>
-            </a:blip>
-            <a:srcRect/>
-            <a:tile tx="889000" ty="0" sx="100000" sy="100000" flip="none" algn="tl"/>
-          </a:blipFill>
-          <a:ln>
-            <a:noFill/>
-          </a:ln>
-        </p:spPr>
-        <p:style>
-          <a:lnRef idx="2">
-            <a:schemeClr val="accent1">
-              <a:shade val="50000"/>
-            </a:schemeClr>
-          </a:lnRef>
-          <a:fillRef idx="1">
-            <a:schemeClr val="accent1"/>
-          </a:fillRef>
-          <a:effectRef idx="0">
-            <a:schemeClr val="accent1"/>
-          </a:effectRef>
-          <a:fontRef idx="minor">
-            <a:schemeClr val="lt1"/>
-          </a:fontRef>
-        </p:style>
-        <p:txBody>
-          <a:bodyPr rtlCol="0" anchor="ctr"/>
-          <a:lstStyle/>
-          <a:p>
-            <a:pPr algn="ctr"/>
-            <a:endParaRPr lang="en-US" dirty="0"/>
-          </a:p>
-        </p:txBody>
-      </p:sp>
-      <p:pic>
-        <p:nvPicPr>
-          <p:cNvPr id="8" name="Объект 4" descr="Изображение выглядит как текст, диаграмма, Параллельный, документ&#10;&#10;Автоматически созданное описание">
-            <a:extLst>
-              <a:ext uri="{FF2B5EF4-FFF2-40B4-BE49-F238E27FC236}">
-                <a16:creationId xmlns:a16="http://schemas.microsoft.com/office/drawing/2014/main" id="{E5DC6659-748B-A87B-0EED-5327E18E4AE2}"/>
-              </a:ext>
-            </a:extLst>
-          </p:cNvPr>
-          <p:cNvPicPr>
-            <a:picLocks noGrp="1" noChangeAspect="1"/>
-          </p:cNvPicPr>
-          <p:nvPr>
-            <p:ph idx="1"/>
-          </p:nvPr>
-        </p:nvPicPr>
-        <p:blipFill>
-          <a:blip r:embed="rId4">
-            <a:extLst>
-              <a:ext uri="{28A0092B-C50C-407E-A947-70E740481C1C}">
-                <a14:useLocalDpi xmlns:a14="http://schemas.microsoft.com/office/drawing/2010/main" val="0"/>
-              </a:ext>
-            </a:extLst>
-          </a:blip>
-          <a:stretch>
-            <a:fillRect/>
-          </a:stretch>
-        </p:blipFill>
-        <p:spPr>
-          <a:xfrm>
-            <a:off x="3748325" y="0"/>
-            <a:ext cx="8440614" cy="6858000"/>
-          </a:xfrm>
-          <a:prstGeom prst="rect">
-            <a:avLst/>
-          </a:prstGeom>
-        </p:spPr>
-      </p:pic>
-    </p:spTree>
-    <p:extLst>
-      <p:ext uri="{BB962C8B-B14F-4D97-AF65-F5344CB8AC3E}">
-        <p14:creationId xmlns:p14="http://schemas.microsoft.com/office/powerpoint/2010/main" val="3284122077"/>
       </p:ext>
     </p:extLst>
   </p:cSld>

</xml_diff>